<commit_message>
Add slides to GMS DIaler
</commit_message>
<xml_diff>
--- a/Android10/5_2_2_GMS_App_Investigations_Dialer.pptx
+++ b/Android10/5_2_2_GMS_App_Investigations_Dialer.pptx
@@ -5,7 +5,7 @@
     <p:sldMasterId id="2147483648" r:id="rId1"/>
   </p:sldMasterIdLst>
   <p:notesMasterIdLst>
-    <p:notesMasterId r:id="rId33"/>
+    <p:notesMasterId r:id="rId37"/>
   </p:notesMasterIdLst>
   <p:sldIdLst>
     <p:sldId id="256" r:id="rId2"/>
@@ -26,19 +26,23 @@
     <p:sldId id="525" r:id="rId17"/>
     <p:sldId id="527" r:id="rId18"/>
     <p:sldId id="530" r:id="rId19"/>
-    <p:sldId id="551" r:id="rId20"/>
-    <p:sldId id="543" r:id="rId21"/>
-    <p:sldId id="544" r:id="rId22"/>
-    <p:sldId id="553" r:id="rId23"/>
-    <p:sldId id="545" r:id="rId24"/>
-    <p:sldId id="533" r:id="rId25"/>
-    <p:sldId id="554" r:id="rId26"/>
-    <p:sldId id="538" r:id="rId27"/>
-    <p:sldId id="539" r:id="rId28"/>
-    <p:sldId id="555" r:id="rId29"/>
-    <p:sldId id="535" r:id="rId30"/>
-    <p:sldId id="536" r:id="rId31"/>
-    <p:sldId id="526" r:id="rId32"/>
+    <p:sldId id="556" r:id="rId20"/>
+    <p:sldId id="557" r:id="rId21"/>
+    <p:sldId id="551" r:id="rId22"/>
+    <p:sldId id="543" r:id="rId23"/>
+    <p:sldId id="544" r:id="rId24"/>
+    <p:sldId id="553" r:id="rId25"/>
+    <p:sldId id="545" r:id="rId26"/>
+    <p:sldId id="533" r:id="rId27"/>
+    <p:sldId id="554" r:id="rId28"/>
+    <p:sldId id="538" r:id="rId29"/>
+    <p:sldId id="539" r:id="rId30"/>
+    <p:sldId id="558" r:id="rId31"/>
+    <p:sldId id="559" r:id="rId32"/>
+    <p:sldId id="555" r:id="rId33"/>
+    <p:sldId id="535" r:id="rId34"/>
+    <p:sldId id="536" r:id="rId35"/>
+    <p:sldId id="526" r:id="rId36"/>
   </p:sldIdLst>
   <p:sldSz cx="12192000" cy="6858000"/>
   <p:notesSz cx="6858000" cy="9144000"/>
@@ -160,7 +164,7 @@
 <file path=ppt/revisionInfo.xml><?xml version="1.0" encoding="utf-8"?>
 <p1510:revInfo xmlns:a="http://schemas.openxmlformats.org/drawingml/2006/main" xmlns:r="http://schemas.openxmlformats.org/officeDocument/2006/relationships" xmlns:p1510="http://schemas.microsoft.com/office/powerpoint/2015/10/main">
   <p1510:revLst>
-    <p1510:client id="{C93986A8-D257-46D5-A932-87F105AEF0C6}" v="50" dt="2025-04-15T15:28:58.478"/>
+    <p1510:client id="{C93986A8-D257-46D5-A932-87F105AEF0C6}" v="58" dt="2025-04-23T14:03:58.719"/>
   </p1510:revLst>
 </p1510:revInfo>
 </file>
@@ -5736,7 +5740,7 @@
   <pc:docChgLst>
     <pc:chgData name="Weifeng Xu" userId="e7aed605-a3dd-4d5a-a692-a87037af107b" providerId="ADAL" clId="{C93986A8-D257-46D5-A932-87F105AEF0C6}"/>
     <pc:docChg chg="undo redo custSel addSld delSld modSld sldOrd">
-      <pc:chgData name="Weifeng Xu" userId="e7aed605-a3dd-4d5a-a692-a87037af107b" providerId="ADAL" clId="{C93986A8-D257-46D5-A932-87F105AEF0C6}" dt="2025-04-15T15:29:10.420" v="2865" actId="20577"/>
+      <pc:chgData name="Weifeng Xu" userId="e7aed605-a3dd-4d5a-a692-a87037af107b" providerId="ADAL" clId="{C93986A8-D257-46D5-A932-87F105AEF0C6}" dt="2025-04-23T14:12:02.738" v="3140" actId="1076"/>
       <pc:docMkLst>
         <pc:docMk/>
       </pc:docMkLst>
@@ -6104,14 +6108,6 @@
           <pc:docMk/>
           <pc:sldMk cId="1798688075" sldId="521"/>
         </pc:sldMkLst>
-        <pc:spChg chg="del mod">
-          <ac:chgData name="Weifeng Xu" userId="e7aed605-a3dd-4d5a-a692-a87037af107b" providerId="ADAL" clId="{C93986A8-D257-46D5-A932-87F105AEF0C6}" dt="2025-04-15T14:53:05.867" v="2409" actId="700"/>
-          <ac:spMkLst>
-            <pc:docMk/>
-            <pc:sldMk cId="1798688075" sldId="521"/>
-            <ac:spMk id="4" creationId="{C56E7611-8511-43F9-B6DC-680747335AF4}"/>
-          </ac:spMkLst>
-        </pc:spChg>
         <pc:picChg chg="mod">
           <ac:chgData name="Weifeng Xu" userId="e7aed605-a3dd-4d5a-a692-a87037af107b" providerId="ADAL" clId="{C93986A8-D257-46D5-A932-87F105AEF0C6}" dt="2025-04-15T14:53:10.150" v="2410" actId="1076"/>
           <ac:picMkLst>
@@ -6158,38 +6154,6 @@
           <pc:docMk/>
           <pc:sldMk cId="3057585943" sldId="523"/>
         </pc:sldMkLst>
-        <pc:spChg chg="add del mod">
-          <ac:chgData name="Weifeng Xu" userId="e7aed605-a3dd-4d5a-a692-a87037af107b" providerId="ADAL" clId="{C93986A8-D257-46D5-A932-87F105AEF0C6}" dt="2025-04-15T15:03:23.208" v="2483" actId="478"/>
-          <ac:spMkLst>
-            <pc:docMk/>
-            <pc:sldMk cId="3057585943" sldId="523"/>
-            <ac:spMk id="2" creationId="{5D132F43-DC25-1034-768F-995957AF84E5}"/>
-          </ac:spMkLst>
-        </pc:spChg>
-        <pc:spChg chg="add del mod">
-          <ac:chgData name="Weifeng Xu" userId="e7aed605-a3dd-4d5a-a692-a87037af107b" providerId="ADAL" clId="{C93986A8-D257-46D5-A932-87F105AEF0C6}" dt="2025-04-15T15:03:23.208" v="2483" actId="478"/>
-          <ac:spMkLst>
-            <pc:docMk/>
-            <pc:sldMk cId="3057585943" sldId="523"/>
-            <ac:spMk id="3" creationId="{65FD65D0-C3A2-FD60-83FB-3D419AF7AA32}"/>
-          </ac:spMkLst>
-        </pc:spChg>
-        <pc:spChg chg="del">
-          <ac:chgData name="Weifeng Xu" userId="e7aed605-a3dd-4d5a-a692-a87037af107b" providerId="ADAL" clId="{C93986A8-D257-46D5-A932-87F105AEF0C6}" dt="2025-04-15T15:03:23.208" v="2483" actId="478"/>
-          <ac:spMkLst>
-            <pc:docMk/>
-            <pc:sldMk cId="3057585943" sldId="523"/>
-            <ac:spMk id="6" creationId="{BFB5C54F-7E34-42AD-9CBA-061E6E4D4A76}"/>
-          </ac:spMkLst>
-        </pc:spChg>
-        <pc:picChg chg="del mod">
-          <ac:chgData name="Weifeng Xu" userId="e7aed605-a3dd-4d5a-a692-a87037af107b" providerId="ADAL" clId="{C93986A8-D257-46D5-A932-87F105AEF0C6}" dt="2025-04-15T15:03:23.208" v="2483" actId="478"/>
-          <ac:picMkLst>
-            <pc:docMk/>
-            <pc:sldMk cId="3057585943" sldId="523"/>
-            <ac:picMk id="5" creationId="{BA00B114-EB72-495B-88DF-D2D75B198CDF}"/>
-          </ac:picMkLst>
-        </pc:picChg>
         <pc:picChg chg="add mod">
           <ac:chgData name="Weifeng Xu" userId="e7aed605-a3dd-4d5a-a692-a87037af107b" providerId="ADAL" clId="{C93986A8-D257-46D5-A932-87F105AEF0C6}" dt="2025-04-15T15:04:24.246" v="2485" actId="1076"/>
           <ac:picMkLst>
@@ -6338,7 +6302,7 @@
         </pc:sldMkLst>
       </pc:sldChg>
       <pc:sldChg chg="addSp modSp new mod modClrScheme chgLayout">
-        <pc:chgData name="Weifeng Xu" userId="e7aed605-a3dd-4d5a-a692-a87037af107b" providerId="ADAL" clId="{C93986A8-D257-46D5-A932-87F105AEF0C6}" dt="2025-04-15T15:28:02.828" v="2853" actId="20577"/>
+        <pc:chgData name="Weifeng Xu" userId="e7aed605-a3dd-4d5a-a692-a87037af107b" providerId="ADAL" clId="{C93986A8-D257-46D5-A932-87F105AEF0C6}" dt="2025-04-23T13:52:35.037" v="3030" actId="6549"/>
         <pc:sldMkLst>
           <pc:docMk/>
           <pc:sldMk cId="3578698584" sldId="538"/>
@@ -6352,7 +6316,7 @@
           </ac:spMkLst>
         </pc:spChg>
         <pc:spChg chg="mod">
-          <ac:chgData name="Weifeng Xu" userId="e7aed605-a3dd-4d5a-a692-a87037af107b" providerId="ADAL" clId="{C93986A8-D257-46D5-A932-87F105AEF0C6}" dt="2025-04-15T15:28:02.828" v="2853" actId="20577"/>
+          <ac:chgData name="Weifeng Xu" userId="e7aed605-a3dd-4d5a-a692-a87037af107b" providerId="ADAL" clId="{C93986A8-D257-46D5-A932-87F105AEF0C6}" dt="2025-04-23T13:52:35.037" v="3030" actId="6549"/>
           <ac:spMkLst>
             <pc:docMk/>
             <pc:sldMk cId="3578698584" sldId="538"/>
@@ -6369,11 +6333,75 @@
         </pc:picChg>
       </pc:sldChg>
       <pc:sldChg chg="addSp delSp modSp new mod modClrScheme chgLayout">
-        <pc:chgData name="Weifeng Xu" userId="e7aed605-a3dd-4d5a-a692-a87037af107b" providerId="ADAL" clId="{C93986A8-D257-46D5-A932-87F105AEF0C6}" dt="2021-08-15T03:28:20.644" v="1504" actId="20577"/>
+        <pc:chgData name="Weifeng Xu" userId="e7aed605-a3dd-4d5a-a692-a87037af107b" providerId="ADAL" clId="{C93986A8-D257-46D5-A932-87F105AEF0C6}" dt="2025-04-23T14:03:45.394" v="3060" actId="1076"/>
         <pc:sldMkLst>
           <pc:docMk/>
           <pc:sldMk cId="1495699096" sldId="539"/>
         </pc:sldMkLst>
+        <pc:spChg chg="add del mod">
+          <ac:chgData name="Weifeng Xu" userId="e7aed605-a3dd-4d5a-a692-a87037af107b" providerId="ADAL" clId="{C93986A8-D257-46D5-A932-87F105AEF0C6}" dt="2025-04-23T14:00:51.386" v="3037" actId="478"/>
+          <ac:spMkLst>
+            <pc:docMk/>
+            <pc:sldMk cId="1495699096" sldId="539"/>
+            <ac:spMk id="3" creationId="{C248125D-58D9-AA2D-94EB-7A8F5530FF69}"/>
+          </ac:spMkLst>
+        </pc:spChg>
+        <pc:spChg chg="add del">
+          <ac:chgData name="Weifeng Xu" userId="e7aed605-a3dd-4d5a-a692-a87037af107b" providerId="ADAL" clId="{C93986A8-D257-46D5-A932-87F105AEF0C6}" dt="2025-04-23T14:03:34.233" v="3057" actId="478"/>
+          <ac:spMkLst>
+            <pc:docMk/>
+            <pc:sldMk cId="1495699096" sldId="539"/>
+            <ac:spMk id="4" creationId="{839E01B5-FEAE-F946-76B6-6F2E39289AE2}"/>
+          </ac:spMkLst>
+        </pc:spChg>
+        <pc:spChg chg="add del mod">
+          <ac:chgData name="Weifeng Xu" userId="e7aed605-a3dd-4d5a-a692-a87037af107b" providerId="ADAL" clId="{C93986A8-D257-46D5-A932-87F105AEF0C6}" dt="2025-04-23T14:03:41.136" v="3059" actId="478"/>
+          <ac:spMkLst>
+            <pc:docMk/>
+            <pc:sldMk cId="1495699096" sldId="539"/>
+            <ac:spMk id="8" creationId="{B5651676-C79B-DD14-5955-D2B361B87A24}"/>
+          </ac:spMkLst>
+        </pc:spChg>
+        <pc:spChg chg="mod">
+          <ac:chgData name="Weifeng Xu" userId="e7aed605-a3dd-4d5a-a692-a87037af107b" providerId="ADAL" clId="{C93986A8-D257-46D5-A932-87F105AEF0C6}" dt="2025-04-23T14:03:45.394" v="3060" actId="1076"/>
+          <ac:spMkLst>
+            <pc:docMk/>
+            <pc:sldMk cId="1495699096" sldId="539"/>
+            <ac:spMk id="10" creationId="{38963192-A564-4C49-BA1C-22C3F488DFF0}"/>
+          </ac:spMkLst>
+        </pc:spChg>
+        <pc:spChg chg="del">
+          <ac:chgData name="Weifeng Xu" userId="e7aed605-a3dd-4d5a-a692-a87037af107b" providerId="ADAL" clId="{C93986A8-D257-46D5-A932-87F105AEF0C6}" dt="2025-04-23T14:03:38.242" v="3058" actId="478"/>
+          <ac:spMkLst>
+            <pc:docMk/>
+            <pc:sldMk cId="1495699096" sldId="539"/>
+            <ac:spMk id="11" creationId="{884103A9-E37C-4959-A633-0363560DA7CE}"/>
+          </ac:spMkLst>
+        </pc:spChg>
+        <pc:picChg chg="mod">
+          <ac:chgData name="Weifeng Xu" userId="e7aed605-a3dd-4d5a-a692-a87037af107b" providerId="ADAL" clId="{C93986A8-D257-46D5-A932-87F105AEF0C6}" dt="2025-04-23T14:03:45.394" v="3060" actId="1076"/>
+          <ac:picMkLst>
+            <pc:docMk/>
+            <pc:sldMk cId="1495699096" sldId="539"/>
+            <ac:picMk id="5" creationId="{CDC9D4A2-1A29-419B-8CF3-FA31B4B46DC0}"/>
+          </ac:picMkLst>
+        </pc:picChg>
+        <pc:picChg chg="mod">
+          <ac:chgData name="Weifeng Xu" userId="e7aed605-a3dd-4d5a-a692-a87037af107b" providerId="ADAL" clId="{C93986A8-D257-46D5-A932-87F105AEF0C6}" dt="2025-04-23T14:03:45.394" v="3060" actId="1076"/>
+          <ac:picMkLst>
+            <pc:docMk/>
+            <pc:sldMk cId="1495699096" sldId="539"/>
+            <ac:picMk id="7" creationId="{390BE3CF-794C-4B41-85D5-B314048A8AED}"/>
+          </ac:picMkLst>
+        </pc:picChg>
+        <pc:picChg chg="del">
+          <ac:chgData name="Weifeng Xu" userId="e7aed605-a3dd-4d5a-a692-a87037af107b" providerId="ADAL" clId="{C93986A8-D257-46D5-A932-87F105AEF0C6}" dt="2025-04-23T14:03:38.242" v="3058" actId="478"/>
+          <ac:picMkLst>
+            <pc:docMk/>
+            <pc:sldMk cId="1495699096" sldId="539"/>
+            <ac:picMk id="9" creationId="{B6516974-8E35-4D9E-8B52-0F9861769110}"/>
+          </ac:picMkLst>
+        </pc:picChg>
       </pc:sldChg>
       <pc:sldChg chg="addSp delSp modSp new mod modClrScheme chgLayout">
         <pc:chgData name="Weifeng Xu" userId="e7aed605-a3dd-4d5a-a692-a87037af107b" providerId="ADAL" clId="{C93986A8-D257-46D5-A932-87F105AEF0C6}" dt="2025-04-15T15:06:05.377" v="2493" actId="20577"/>
@@ -6558,22 +6586,6 @@
           <pc:docMk/>
           <pc:sldMk cId="1288205896" sldId="547"/>
         </pc:sldMkLst>
-        <pc:spChg chg="del mod ord">
-          <ac:chgData name="Weifeng Xu" userId="e7aed605-a3dd-4d5a-a692-a87037af107b" providerId="ADAL" clId="{C93986A8-D257-46D5-A932-87F105AEF0C6}" dt="2025-04-15T14:38:51.995" v="2247" actId="700"/>
-          <ac:spMkLst>
-            <pc:docMk/>
-            <pc:sldMk cId="1288205896" sldId="547"/>
-            <ac:spMk id="2" creationId="{996B2B42-437A-41A2-4F10-C1DCCB945A26}"/>
-          </ac:spMkLst>
-        </pc:spChg>
-        <pc:spChg chg="del mod ord">
-          <ac:chgData name="Weifeng Xu" userId="e7aed605-a3dd-4d5a-a692-a87037af107b" providerId="ADAL" clId="{C93986A8-D257-46D5-A932-87F105AEF0C6}" dt="2025-04-15T14:38:51.995" v="2247" actId="700"/>
-          <ac:spMkLst>
-            <pc:docMk/>
-            <pc:sldMk cId="1288205896" sldId="547"/>
-            <ac:spMk id="3" creationId="{36659EFF-7D73-2BD3-B78D-2B7F01C68099}"/>
-          </ac:spMkLst>
-        </pc:spChg>
         <pc:spChg chg="add mod ord">
           <ac:chgData name="Weifeng Xu" userId="e7aed605-a3dd-4d5a-a692-a87037af107b" providerId="ADAL" clId="{C93986A8-D257-46D5-A932-87F105AEF0C6}" dt="2025-04-15T14:47:58.675" v="2265" actId="6549"/>
           <ac:spMkLst>
@@ -6590,14 +6602,6 @@
             <ac:spMk id="5" creationId="{7C748658-C1FA-0E07-4439-328FE2A6EFC7}"/>
           </ac:spMkLst>
         </pc:spChg>
-        <pc:spChg chg="add del mod ord">
-          <ac:chgData name="Weifeng Xu" userId="e7aed605-a3dd-4d5a-a692-a87037af107b" providerId="ADAL" clId="{C93986A8-D257-46D5-A932-87F105AEF0C6}" dt="2025-04-15T14:47:53.817" v="2264" actId="700"/>
-          <ac:spMkLst>
-            <pc:docMk/>
-            <pc:sldMk cId="1288205896" sldId="547"/>
-            <ac:spMk id="6" creationId="{69D81759-1FF8-4E7B-A2D9-7975F397F266}"/>
-          </ac:spMkLst>
-        </pc:spChg>
       </pc:sldChg>
       <pc:sldChg chg="addSp delSp modSp new mod modClrScheme chgLayout">
         <pc:chgData name="Weifeng Xu" userId="e7aed605-a3dd-4d5a-a692-a87037af107b" providerId="ADAL" clId="{C93986A8-D257-46D5-A932-87F105AEF0C6}" dt="2025-04-15T14:52:51.769" v="2407" actId="207"/>
@@ -6605,22 +6609,6 @@
           <pc:docMk/>
           <pc:sldMk cId="1733187922" sldId="548"/>
         </pc:sldMkLst>
-        <pc:spChg chg="del mod ord">
-          <ac:chgData name="Weifeng Xu" userId="e7aed605-a3dd-4d5a-a692-a87037af107b" providerId="ADAL" clId="{C93986A8-D257-46D5-A932-87F105AEF0C6}" dt="2025-04-15T14:48:05.465" v="2267" actId="700"/>
-          <ac:spMkLst>
-            <pc:docMk/>
-            <pc:sldMk cId="1733187922" sldId="548"/>
-            <ac:spMk id="2" creationId="{0F61DE08-D720-C839-EFDE-90C1C45F5185}"/>
-          </ac:spMkLst>
-        </pc:spChg>
-        <pc:spChg chg="del mod ord">
-          <ac:chgData name="Weifeng Xu" userId="e7aed605-a3dd-4d5a-a692-a87037af107b" providerId="ADAL" clId="{C93986A8-D257-46D5-A932-87F105AEF0C6}" dt="2025-04-15T14:48:05.465" v="2267" actId="700"/>
-          <ac:spMkLst>
-            <pc:docMk/>
-            <pc:sldMk cId="1733187922" sldId="548"/>
-            <ac:spMk id="3" creationId="{1D802E35-ED2A-69BE-AE60-9D4F6A500C03}"/>
-          </ac:spMkLst>
-        </pc:spChg>
         <pc:spChg chg="add mod ord">
           <ac:chgData name="Weifeng Xu" userId="e7aed605-a3dd-4d5a-a692-a87037af107b" providerId="ADAL" clId="{C93986A8-D257-46D5-A932-87F105AEF0C6}" dt="2025-04-15T14:48:26.178" v="2291" actId="6549"/>
           <ac:spMkLst>
@@ -6639,29 +6627,13 @@
         </pc:spChg>
       </pc:sldChg>
       <pc:sldChg chg="addSp delSp modSp new mod modClrScheme chgLayout">
-        <pc:chgData name="Weifeng Xu" userId="e7aed605-a3dd-4d5a-a692-a87037af107b" providerId="ADAL" clId="{C93986A8-D257-46D5-A932-87F105AEF0C6}" dt="2025-04-15T14:57:06.463" v="2480" actId="20577"/>
+        <pc:chgData name="Weifeng Xu" userId="e7aed605-a3dd-4d5a-a692-a87037af107b" providerId="ADAL" clId="{C93986A8-D257-46D5-A932-87F105AEF0C6}" dt="2025-04-23T13:19:21.651" v="2867" actId="20577"/>
         <pc:sldMkLst>
           <pc:docMk/>
           <pc:sldMk cId="2185650768" sldId="549"/>
         </pc:sldMkLst>
-        <pc:spChg chg="del mod ord">
-          <ac:chgData name="Weifeng Xu" userId="e7aed605-a3dd-4d5a-a692-a87037af107b" providerId="ADAL" clId="{C93986A8-D257-46D5-A932-87F105AEF0C6}" dt="2025-04-15T14:53:28.044" v="2421" actId="700"/>
-          <ac:spMkLst>
-            <pc:docMk/>
-            <pc:sldMk cId="2185650768" sldId="549"/>
-            <ac:spMk id="2" creationId="{333D27BB-2799-02F8-B621-DB500983D5FD}"/>
-          </ac:spMkLst>
-        </pc:spChg>
-        <pc:spChg chg="del mod ord">
-          <ac:chgData name="Weifeng Xu" userId="e7aed605-a3dd-4d5a-a692-a87037af107b" providerId="ADAL" clId="{C93986A8-D257-46D5-A932-87F105AEF0C6}" dt="2025-04-15T14:53:28.044" v="2421" actId="700"/>
-          <ac:spMkLst>
-            <pc:docMk/>
-            <pc:sldMk cId="2185650768" sldId="549"/>
-            <ac:spMk id="3" creationId="{E6508BA7-F877-ECE9-2334-9F62181A3CBA}"/>
-          </ac:spMkLst>
-        </pc:spChg>
         <pc:spChg chg="add mod ord">
-          <ac:chgData name="Weifeng Xu" userId="e7aed605-a3dd-4d5a-a692-a87037af107b" providerId="ADAL" clId="{C93986A8-D257-46D5-A932-87F105AEF0C6}" dt="2025-04-15T14:57:06.463" v="2480" actId="20577"/>
+          <ac:chgData name="Weifeng Xu" userId="e7aed605-a3dd-4d5a-a692-a87037af107b" providerId="ADAL" clId="{C93986A8-D257-46D5-A932-87F105AEF0C6}" dt="2025-04-23T13:19:21.651" v="2867" actId="20577"/>
           <ac:spMkLst>
             <pc:docMk/>
             <pc:sldMk cId="2185650768" sldId="549"/>
@@ -6683,22 +6655,6 @@
           <pc:docMk/>
           <pc:sldMk cId="3946298176" sldId="550"/>
         </pc:sldMkLst>
-        <pc:spChg chg="del mod ord">
-          <ac:chgData name="Weifeng Xu" userId="e7aed605-a3dd-4d5a-a692-a87037af107b" providerId="ADAL" clId="{C93986A8-D257-46D5-A932-87F105AEF0C6}" dt="2025-04-15T14:55:19.044" v="2463" actId="700"/>
-          <ac:spMkLst>
-            <pc:docMk/>
-            <pc:sldMk cId="3946298176" sldId="550"/>
-            <ac:spMk id="2" creationId="{53C5DA0A-6BD1-458E-9ACF-1F0F3F525FB9}"/>
-          </ac:spMkLst>
-        </pc:spChg>
-        <pc:spChg chg="del mod ord">
-          <ac:chgData name="Weifeng Xu" userId="e7aed605-a3dd-4d5a-a692-a87037af107b" providerId="ADAL" clId="{C93986A8-D257-46D5-A932-87F105AEF0C6}" dt="2025-04-15T14:55:19.044" v="2463" actId="700"/>
-          <ac:spMkLst>
-            <pc:docMk/>
-            <pc:sldMk cId="3946298176" sldId="550"/>
-            <ac:spMk id="3" creationId="{3776A5DD-05BA-89DD-C850-3B62D6E2BB01}"/>
-          </ac:spMkLst>
-        </pc:spChg>
         <pc:spChg chg="add mod ord">
           <ac:chgData name="Weifeng Xu" userId="e7aed605-a3dd-4d5a-a692-a87037af107b" providerId="ADAL" clId="{C93986A8-D257-46D5-A932-87F105AEF0C6}" dt="2025-04-15T15:06:26.718" v="2497" actId="20577"/>
           <ac:spMkLst>
@@ -6798,6 +6754,194 @@
             <ac:spMk id="4" creationId="{84C29BEA-A4BA-50A6-F384-78E18FAC007D}"/>
           </ac:spMkLst>
         </pc:spChg>
+      </pc:sldChg>
+      <pc:sldChg chg="addSp delSp modSp new mod ord">
+        <pc:chgData name="Weifeng Xu" userId="e7aed605-a3dd-4d5a-a692-a87037af107b" providerId="ADAL" clId="{C93986A8-D257-46D5-A932-87F105AEF0C6}" dt="2025-04-23T13:37:52.781" v="2878"/>
+        <pc:sldMkLst>
+          <pc:docMk/>
+          <pc:sldMk cId="674427553" sldId="556"/>
+        </pc:sldMkLst>
+        <pc:picChg chg="add del mod">
+          <ac:chgData name="Weifeng Xu" userId="e7aed605-a3dd-4d5a-a692-a87037af107b" providerId="ADAL" clId="{C93986A8-D257-46D5-A932-87F105AEF0C6}" dt="2025-04-23T13:36:20.523" v="2873" actId="478"/>
+          <ac:picMkLst>
+            <pc:docMk/>
+            <pc:sldMk cId="674427553" sldId="556"/>
+            <ac:picMk id="3" creationId="{715FBD11-8589-D6BB-6E5C-0EE218871829}"/>
+          </ac:picMkLst>
+        </pc:picChg>
+        <pc:picChg chg="add mod">
+          <ac:chgData name="Weifeng Xu" userId="e7aed605-a3dd-4d5a-a692-a87037af107b" providerId="ADAL" clId="{C93986A8-D257-46D5-A932-87F105AEF0C6}" dt="2025-04-23T13:36:47.251" v="2876" actId="1076"/>
+          <ac:picMkLst>
+            <pc:docMk/>
+            <pc:sldMk cId="674427553" sldId="556"/>
+            <ac:picMk id="5" creationId="{0B69BCC3-98E6-D667-4594-F40A6AA2898A}"/>
+          </ac:picMkLst>
+        </pc:picChg>
+      </pc:sldChg>
+      <pc:sldChg chg="addSp delSp modSp new mod modClrScheme chgLayout">
+        <pc:chgData name="Weifeng Xu" userId="e7aed605-a3dd-4d5a-a692-a87037af107b" providerId="ADAL" clId="{C93986A8-D257-46D5-A932-87F105AEF0C6}" dt="2025-04-23T13:48:22.906" v="3028" actId="207"/>
+        <pc:sldMkLst>
+          <pc:docMk/>
+          <pc:sldMk cId="792115356" sldId="557"/>
+        </pc:sldMkLst>
+        <pc:spChg chg="add mod">
+          <ac:chgData name="Weifeng Xu" userId="e7aed605-a3dd-4d5a-a692-a87037af107b" providerId="ADAL" clId="{C93986A8-D257-46D5-A932-87F105AEF0C6}" dt="2025-04-23T13:39:24.236" v="2993" actId="207"/>
+          <ac:spMkLst>
+            <pc:docMk/>
+            <pc:sldMk cId="792115356" sldId="557"/>
+            <ac:spMk id="2" creationId="{935775B0-C8A1-C69F-6DC3-CC0976DAC231}"/>
+          </ac:spMkLst>
+        </pc:spChg>
+        <pc:spChg chg="add del mod">
+          <ac:chgData name="Weifeng Xu" userId="e7aed605-a3dd-4d5a-a692-a87037af107b" providerId="ADAL" clId="{C93986A8-D257-46D5-A932-87F105AEF0C6}" dt="2025-04-23T13:48:22.906" v="3028" actId="207"/>
+          <ac:spMkLst>
+            <pc:docMk/>
+            <pc:sldMk cId="792115356" sldId="557"/>
+            <ac:spMk id="3" creationId="{68FDF470-BF87-92FD-26B4-CF9CE27F9631}"/>
+          </ac:spMkLst>
+        </pc:spChg>
+        <pc:spChg chg="add mod">
+          <ac:chgData name="Weifeng Xu" userId="e7aed605-a3dd-4d5a-a692-a87037af107b" providerId="ADAL" clId="{C93986A8-D257-46D5-A932-87F105AEF0C6}" dt="2025-04-23T13:39:36.903" v="2995"/>
+          <ac:spMkLst>
+            <pc:docMk/>
+            <pc:sldMk cId="792115356" sldId="557"/>
+            <ac:spMk id="4" creationId="{FBB21A85-A85C-4C2C-795D-0E0B368E714F}"/>
+          </ac:spMkLst>
+        </pc:spChg>
+      </pc:sldChg>
+      <pc:sldChg chg="addSp delSp modSp add mod modClrScheme chgLayout">
+        <pc:chgData name="Weifeng Xu" userId="e7aed605-a3dd-4d5a-a692-a87037af107b" providerId="ADAL" clId="{C93986A8-D257-46D5-A932-87F105AEF0C6}" dt="2025-04-23T14:07:36.650" v="3122" actId="6549"/>
+        <pc:sldMkLst>
+          <pc:docMk/>
+          <pc:sldMk cId="204470065" sldId="558"/>
+        </pc:sldMkLst>
+        <pc:spChg chg="add mod ord">
+          <ac:chgData name="Weifeng Xu" userId="e7aed605-a3dd-4d5a-a692-a87037af107b" providerId="ADAL" clId="{C93986A8-D257-46D5-A932-87F105AEF0C6}" dt="2025-04-23T14:05:17.642" v="3091" actId="1076"/>
+          <ac:spMkLst>
+            <pc:docMk/>
+            <pc:sldMk cId="204470065" sldId="558"/>
+            <ac:spMk id="2" creationId="{E77662BB-5E19-1844-09CE-C040110E0FC5}"/>
+          </ac:spMkLst>
+        </pc:spChg>
+        <pc:spChg chg="add del mod ord">
+          <ac:chgData name="Weifeng Xu" userId="e7aed605-a3dd-4d5a-a692-a87037af107b" providerId="ADAL" clId="{C93986A8-D257-46D5-A932-87F105AEF0C6}" dt="2025-04-23T14:05:00.314" v="3084" actId="700"/>
+          <ac:spMkLst>
+            <pc:docMk/>
+            <pc:sldMk cId="204470065" sldId="558"/>
+            <ac:spMk id="3" creationId="{453C7C40-E646-6FD6-6F83-46161622F8FE}"/>
+          </ac:spMkLst>
+        </pc:spChg>
+        <pc:spChg chg="del mod">
+          <ac:chgData name="Weifeng Xu" userId="e7aed605-a3dd-4d5a-a692-a87037af107b" providerId="ADAL" clId="{C93986A8-D257-46D5-A932-87F105AEF0C6}" dt="2025-04-23T14:03:58.719" v="3063" actId="478"/>
+          <ac:spMkLst>
+            <pc:docMk/>
+            <pc:sldMk cId="204470065" sldId="558"/>
+            <ac:spMk id="4" creationId="{DFB1B673-83A9-4316-A8B7-F7FE3E4F59A4}"/>
+          </ac:spMkLst>
+        </pc:spChg>
+        <pc:spChg chg="add mod ord">
+          <ac:chgData name="Weifeng Xu" userId="e7aed605-a3dd-4d5a-a692-a87037af107b" providerId="ADAL" clId="{C93986A8-D257-46D5-A932-87F105AEF0C6}" dt="2025-04-23T14:07:36.650" v="3122" actId="6549"/>
+          <ac:spMkLst>
+            <pc:docMk/>
+            <pc:sldMk cId="204470065" sldId="558"/>
+            <ac:spMk id="6" creationId="{CAD5851A-A011-5D7C-F84D-94BC70EEB92D}"/>
+          </ac:spMkLst>
+        </pc:spChg>
+        <pc:spChg chg="del mod">
+          <ac:chgData name="Weifeng Xu" userId="e7aed605-a3dd-4d5a-a692-a87037af107b" providerId="ADAL" clId="{C93986A8-D257-46D5-A932-87F105AEF0C6}" dt="2025-04-23T14:05:04.696" v="3087"/>
+          <ac:spMkLst>
+            <pc:docMk/>
+            <pc:sldMk cId="204470065" sldId="558"/>
+            <ac:spMk id="8" creationId="{C86D0EED-2218-E01A-416D-BC6E7FD36317}"/>
+          </ac:spMkLst>
+        </pc:spChg>
+        <pc:spChg chg="del">
+          <ac:chgData name="Weifeng Xu" userId="e7aed605-a3dd-4d5a-a692-a87037af107b" providerId="ADAL" clId="{C93986A8-D257-46D5-A932-87F105AEF0C6}" dt="2025-04-23T14:03:51.623" v="3061" actId="478"/>
+          <ac:spMkLst>
+            <pc:docMk/>
+            <pc:sldMk cId="204470065" sldId="558"/>
+            <ac:spMk id="10" creationId="{3EDA4DB6-6CB4-8408-8308-AD95EC9D6F28}"/>
+          </ac:spMkLst>
+        </pc:spChg>
+        <pc:spChg chg="del mod">
+          <ac:chgData name="Weifeng Xu" userId="e7aed605-a3dd-4d5a-a692-a87037af107b" providerId="ADAL" clId="{C93986A8-D257-46D5-A932-87F105AEF0C6}" dt="2025-04-23T14:04:14.241" v="3066" actId="478"/>
+          <ac:spMkLst>
+            <pc:docMk/>
+            <pc:sldMk cId="204470065" sldId="558"/>
+            <ac:spMk id="11" creationId="{0B96F8FD-8197-681E-EB74-255B17042D20}"/>
+          </ac:spMkLst>
+        </pc:spChg>
+        <pc:picChg chg="del">
+          <ac:chgData name="Weifeng Xu" userId="e7aed605-a3dd-4d5a-a692-a87037af107b" providerId="ADAL" clId="{C93986A8-D257-46D5-A932-87F105AEF0C6}" dt="2025-04-23T14:03:51.623" v="3061" actId="478"/>
+          <ac:picMkLst>
+            <pc:docMk/>
+            <pc:sldMk cId="204470065" sldId="558"/>
+            <ac:picMk id="5" creationId="{59B97951-19C9-26B3-F5F8-59E69090F7C4}"/>
+          </ac:picMkLst>
+        </pc:picChg>
+        <pc:picChg chg="del">
+          <ac:chgData name="Weifeng Xu" userId="e7aed605-a3dd-4d5a-a692-a87037af107b" providerId="ADAL" clId="{C93986A8-D257-46D5-A932-87F105AEF0C6}" dt="2025-04-23T14:03:51.623" v="3061" actId="478"/>
+          <ac:picMkLst>
+            <pc:docMk/>
+            <pc:sldMk cId="204470065" sldId="558"/>
+            <ac:picMk id="7" creationId="{E583F806-330C-D641-D006-77EA4EBD18A6}"/>
+          </ac:picMkLst>
+        </pc:picChg>
+        <pc:picChg chg="mod modCrop">
+          <ac:chgData name="Weifeng Xu" userId="e7aed605-a3dd-4d5a-a692-a87037af107b" providerId="ADAL" clId="{C93986A8-D257-46D5-A932-87F105AEF0C6}" dt="2025-04-23T14:05:31.418" v="3094" actId="1076"/>
+          <ac:picMkLst>
+            <pc:docMk/>
+            <pc:sldMk cId="204470065" sldId="558"/>
+            <ac:picMk id="9" creationId="{AD71472D-94CF-FDF2-3A98-2B1BA51E1DA8}"/>
+          </ac:picMkLst>
+        </pc:picChg>
+      </pc:sldChg>
+      <pc:sldChg chg="addSp delSp modSp new mod modClrScheme chgLayout modNotesTx">
+        <pc:chgData name="Weifeng Xu" userId="e7aed605-a3dd-4d5a-a692-a87037af107b" providerId="ADAL" clId="{C93986A8-D257-46D5-A932-87F105AEF0C6}" dt="2025-04-23T14:12:02.738" v="3140" actId="1076"/>
+        <pc:sldMkLst>
+          <pc:docMk/>
+          <pc:sldMk cId="869897344" sldId="559"/>
+        </pc:sldMkLst>
+        <pc:spChg chg="mod ord">
+          <ac:chgData name="Weifeng Xu" userId="e7aed605-a3dd-4d5a-a692-a87037af107b" providerId="ADAL" clId="{C93986A8-D257-46D5-A932-87F105AEF0C6}" dt="2025-04-23T14:08:30.556" v="3127" actId="700"/>
+          <ac:spMkLst>
+            <pc:docMk/>
+            <pc:sldMk cId="869897344" sldId="559"/>
+            <ac:spMk id="2" creationId="{F470E545-9371-FF9B-EA3E-4174C4CC30BB}"/>
+          </ac:spMkLst>
+        </pc:spChg>
+        <pc:spChg chg="del">
+          <ac:chgData name="Weifeng Xu" userId="e7aed605-a3dd-4d5a-a692-a87037af107b" providerId="ADAL" clId="{C93986A8-D257-46D5-A932-87F105AEF0C6}" dt="2025-04-23T14:08:30.556" v="3127" actId="700"/>
+          <ac:spMkLst>
+            <pc:docMk/>
+            <pc:sldMk cId="869897344" sldId="559"/>
+            <ac:spMk id="3" creationId="{0794A95B-03F4-465F-D34B-1F8C17761B5C}"/>
+          </ac:spMkLst>
+        </pc:spChg>
+        <pc:picChg chg="add del mod">
+          <ac:chgData name="Weifeng Xu" userId="e7aed605-a3dd-4d5a-a692-a87037af107b" providerId="ADAL" clId="{C93986A8-D257-46D5-A932-87F105AEF0C6}" dt="2025-04-23T14:11:01.222" v="3131" actId="478"/>
+          <ac:picMkLst>
+            <pc:docMk/>
+            <pc:sldMk cId="869897344" sldId="559"/>
+            <ac:picMk id="5" creationId="{97AA1BE3-9BC4-3D30-2BB1-67BF8E1A1381}"/>
+          </ac:picMkLst>
+        </pc:picChg>
+        <pc:picChg chg="add mod">
+          <ac:chgData name="Weifeng Xu" userId="e7aed605-a3dd-4d5a-a692-a87037af107b" providerId="ADAL" clId="{C93986A8-D257-46D5-A932-87F105AEF0C6}" dt="2025-04-23T14:12:01.548" v="3139" actId="1076"/>
+          <ac:picMkLst>
+            <pc:docMk/>
+            <pc:sldMk cId="869897344" sldId="559"/>
+            <ac:picMk id="7" creationId="{B3A6942E-2A56-F267-AB97-7F74E477FB84}"/>
+          </ac:picMkLst>
+        </pc:picChg>
+        <pc:picChg chg="add mod">
+          <ac:chgData name="Weifeng Xu" userId="e7aed605-a3dd-4d5a-a692-a87037af107b" providerId="ADAL" clId="{C93986A8-D257-46D5-A932-87F105AEF0C6}" dt="2025-04-23T14:12:02.738" v="3140" actId="1076"/>
+          <ac:picMkLst>
+            <pc:docMk/>
+            <pc:sldMk cId="869897344" sldId="559"/>
+            <ac:picMk id="9" creationId="{505BAD6F-2674-8233-4621-42AEBD982138}"/>
+          </ac:picMkLst>
+        </pc:picChg>
       </pc:sldChg>
     </pc:docChg>
   </pc:docChgLst>
@@ -7847,7 +7991,7 @@
           <a:p>
             <a:fld id="{EE41F6E3-57F9-402E-BDBA-5B2DE11C8530}" type="datetimeFigureOut">
               <a:rPr lang="en-US" smtClean="0"/>
-              <a:t>4/15/2025</a:t>
+              <a:t>4/23/2025</a:t>
             </a:fld>
             <a:endParaRPr lang="en-US"/>
           </a:p>
@@ -8586,6 +8730,323 @@
 </p:notes>
 </file>
 
+<file path=ppt/notesSlides/notesSlide6.xml><?xml version="1.0" encoding="utf-8"?>
+<p:notes xmlns:a="http://schemas.openxmlformats.org/drawingml/2006/main" xmlns:r="http://schemas.openxmlformats.org/officeDocument/2006/relationships" xmlns:p="http://schemas.openxmlformats.org/presentationml/2006/main">
+  <p:cSld>
+    <p:spTree>
+      <p:nvGrpSpPr>
+        <p:cNvPr id="1" name=""/>
+        <p:cNvGrpSpPr/>
+        <p:nvPr/>
+      </p:nvGrpSpPr>
+      <p:grpSpPr>
+        <a:xfrm>
+          <a:off x="0" y="0"/>
+          <a:ext cx="0" cy="0"/>
+          <a:chOff x="0" y="0"/>
+          <a:chExt cx="0" cy="0"/>
+        </a:xfrm>
+      </p:grpSpPr>
+      <p:sp>
+        <p:nvSpPr>
+          <p:cNvPr id="2" name="Slide Image Placeholder 1"/>
+          <p:cNvSpPr>
+            <a:spLocks noGrp="1" noRot="1" noChangeAspect="1"/>
+          </p:cNvSpPr>
+          <p:nvPr>
+            <p:ph type="sldImg"/>
+          </p:nvPr>
+        </p:nvSpPr>
+        <p:spPr/>
+      </p:sp>
+      <p:sp>
+        <p:nvSpPr>
+          <p:cNvPr id="3" name="Notes Placeholder 2"/>
+          <p:cNvSpPr>
+            <a:spLocks noGrp="1"/>
+          </p:cNvSpPr>
+          <p:nvPr>
+            <p:ph type="body" idx="1"/>
+          </p:nvPr>
+        </p:nvSpPr>
+        <p:spPr/>
+        <p:txBody>
+          <a:bodyPr/>
+          <a:lstStyle/>
+          <a:p>
+            <a:r>
+              <a:rPr lang="en-US" dirty="0"/>
+              <a:t>import sqlite3</a:t>
+            </a:r>
+          </a:p>
+          <a:p>
+            <a:endParaRPr lang="en-US" dirty="0"/>
+          </a:p>
+          <a:p>
+            <a:r>
+              <a:rPr lang="en-US" dirty="0"/>
+              <a:t># Connect to the database</a:t>
+            </a:r>
+          </a:p>
+          <a:p>
+            <a:r>
+              <a:rPr lang="en-US" dirty="0"/>
+              <a:t>conn = sqlite3.connect('</a:t>
+            </a:r>
+            <a:r>
+              <a:rPr lang="en-US" dirty="0" err="1"/>
+              <a:t>phone_lookup_history.db</a:t>
+            </a:r>
+            <a:r>
+              <a:rPr lang="en-US" dirty="0"/>
+              <a:t>')</a:t>
+            </a:r>
+          </a:p>
+          <a:p>
+            <a:r>
+              <a:rPr lang="en-US" dirty="0"/>
+              <a:t>cursor = </a:t>
+            </a:r>
+            <a:r>
+              <a:rPr lang="en-US" dirty="0" err="1"/>
+              <a:t>conn.cursor</a:t>
+            </a:r>
+            <a:r>
+              <a:rPr lang="en-US" dirty="0"/>
+              <a:t>()</a:t>
+            </a:r>
+          </a:p>
+          <a:p>
+            <a:endParaRPr lang="en-US" dirty="0"/>
+          </a:p>
+          <a:p>
+            <a:r>
+              <a:rPr lang="en-US" dirty="0"/>
+              <a:t># Query the BLOB data</a:t>
+            </a:r>
+          </a:p>
+          <a:p>
+            <a:r>
+              <a:rPr lang="en-US" dirty="0" err="1"/>
+              <a:t>cursor.execute</a:t>
+            </a:r>
+            <a:r>
+              <a:rPr lang="en-US" dirty="0"/>
+              <a:t>("SELECT </a:t>
+            </a:r>
+            <a:r>
+              <a:rPr lang="en-US" dirty="0" err="1"/>
+              <a:t>normalized_number</a:t>
+            </a:r>
+            <a:r>
+              <a:rPr lang="en-US" dirty="0"/>
+              <a:t>, </a:t>
+            </a:r>
+            <a:r>
+              <a:rPr lang="en-US" dirty="0" err="1"/>
+              <a:t>phone_lookup_info</a:t>
+            </a:r>
+            <a:r>
+              <a:rPr lang="en-US" dirty="0"/>
+              <a:t> FROM </a:t>
+            </a:r>
+            <a:r>
+              <a:rPr lang="en-US" dirty="0" err="1"/>
+              <a:t>PhoneLookupHistory</a:t>
+            </a:r>
+            <a:r>
+              <a:rPr lang="en-US" dirty="0"/>
+              <a:t> WHERE </a:t>
+            </a:r>
+            <a:r>
+              <a:rPr lang="en-US" dirty="0" err="1"/>
+              <a:t>normalized_number</a:t>
+            </a:r>
+            <a:r>
+              <a:rPr lang="en-US" dirty="0"/>
+              <a:t> = '+13269243087'")</a:t>
+            </a:r>
+          </a:p>
+          <a:p>
+            <a:r>
+              <a:rPr lang="en-US" dirty="0"/>
+              <a:t>row = </a:t>
+            </a:r>
+            <a:r>
+              <a:rPr lang="en-US" dirty="0" err="1"/>
+              <a:t>cursor.fetchone</a:t>
+            </a:r>
+            <a:r>
+              <a:rPr lang="en-US" dirty="0"/>
+              <a:t>()</a:t>
+            </a:r>
+          </a:p>
+          <a:p>
+            <a:endParaRPr lang="en-US" dirty="0"/>
+          </a:p>
+          <a:p>
+            <a:r>
+              <a:rPr lang="en-US" dirty="0"/>
+              <a:t>if row:</a:t>
+            </a:r>
+          </a:p>
+          <a:p>
+            <a:r>
+              <a:rPr lang="en-US" dirty="0"/>
+              <a:t>    </a:t>
+            </a:r>
+            <a:r>
+              <a:rPr lang="en-US" dirty="0" err="1"/>
+              <a:t>normalized_number</a:t>
+            </a:r>
+            <a:r>
+              <a:rPr lang="en-US" dirty="0"/>
+              <a:t>, </a:t>
+            </a:r>
+            <a:r>
+              <a:rPr lang="en-US" dirty="0" err="1"/>
+              <a:t>blob_data</a:t>
+            </a:r>
+            <a:r>
+              <a:rPr lang="en-US" dirty="0"/>
+              <a:t> = row</a:t>
+            </a:r>
+          </a:p>
+          <a:p>
+            <a:r>
+              <a:rPr lang="en-US" dirty="0"/>
+              <a:t>    print(</a:t>
+            </a:r>
+            <a:r>
+              <a:rPr lang="en-US" dirty="0" err="1"/>
+              <a:t>f"Phone</a:t>
+            </a:r>
+            <a:r>
+              <a:rPr lang="en-US" dirty="0"/>
+              <a:t> Number: {</a:t>
+            </a:r>
+            <a:r>
+              <a:rPr lang="en-US" dirty="0" err="1"/>
+              <a:t>normalized_number</a:t>
+            </a:r>
+            <a:r>
+              <a:rPr lang="en-US" dirty="0"/>
+              <a:t>}")</a:t>
+            </a:r>
+          </a:p>
+          <a:p>
+            <a:r>
+              <a:rPr lang="en-US" dirty="0"/>
+              <a:t>    </a:t>
+            </a:r>
+          </a:p>
+          <a:p>
+            <a:r>
+              <a:rPr lang="en-US" dirty="0"/>
+              <a:t>    # Save the BLOB to a file for further processing</a:t>
+            </a:r>
+          </a:p>
+          <a:p>
+            <a:r>
+              <a:rPr lang="en-US" dirty="0"/>
+              <a:t>    with open('</a:t>
+            </a:r>
+            <a:r>
+              <a:rPr lang="en-US" dirty="0" err="1"/>
+              <a:t>phone_lookup_info.blob</a:t>
+            </a:r>
+            <a:r>
+              <a:rPr lang="en-US" dirty="0"/>
+              <a:t>', '</a:t>
+            </a:r>
+            <a:r>
+              <a:rPr lang="en-US" dirty="0" err="1"/>
+              <a:t>wb</a:t>
+            </a:r>
+            <a:r>
+              <a:rPr lang="en-US" dirty="0"/>
+              <a:t>') as f:</a:t>
+            </a:r>
+          </a:p>
+          <a:p>
+            <a:r>
+              <a:rPr lang="en-US" dirty="0"/>
+              <a:t>        </a:t>
+            </a:r>
+            <a:r>
+              <a:rPr lang="en-US" dirty="0" err="1"/>
+              <a:t>f.write</a:t>
+            </a:r>
+            <a:r>
+              <a:rPr lang="en-US" dirty="0"/>
+              <a:t>(</a:t>
+            </a:r>
+            <a:r>
+              <a:rPr lang="en-US" dirty="0" err="1"/>
+              <a:t>blob_data</a:t>
+            </a:r>
+            <a:r>
+              <a:rPr lang="en-US" dirty="0"/>
+              <a:t>)</a:t>
+            </a:r>
+          </a:p>
+          <a:p>
+            <a:endParaRPr lang="en-US" dirty="0"/>
+          </a:p>
+          <a:p>
+            <a:r>
+              <a:rPr lang="en-US" dirty="0"/>
+              <a:t># Close the connection</a:t>
+            </a:r>
+          </a:p>
+          <a:p>
+            <a:r>
+              <a:rPr lang="en-US" dirty="0" err="1"/>
+              <a:t>conn.close</a:t>
+            </a:r>
+            <a:r>
+              <a:rPr lang="en-US" dirty="0"/>
+              <a:t>()</a:t>
+            </a:r>
+          </a:p>
+        </p:txBody>
+      </p:sp>
+      <p:sp>
+        <p:nvSpPr>
+          <p:cNvPr id="4" name="Slide Number Placeholder 3"/>
+          <p:cNvSpPr>
+            <a:spLocks noGrp="1"/>
+          </p:cNvSpPr>
+          <p:nvPr>
+            <p:ph type="sldNum" sz="quarter" idx="5"/>
+          </p:nvPr>
+        </p:nvSpPr>
+        <p:spPr/>
+        <p:txBody>
+          <a:bodyPr/>
+          <a:lstStyle/>
+          <a:p>
+            <a:fld id="{DDBF98C7-164A-4723-84F0-B1E4B080DDEC}" type="slidenum">
+              <a:rPr lang="en-US" smtClean="0"/>
+              <a:t>31</a:t>
+            </a:fld>
+            <a:endParaRPr lang="en-US"/>
+          </a:p>
+        </p:txBody>
+      </p:sp>
+    </p:spTree>
+    <p:extLst>
+      <p:ext uri="{BB962C8B-B14F-4D97-AF65-F5344CB8AC3E}">
+        <p14:creationId xmlns:p14="http://schemas.microsoft.com/office/powerpoint/2010/main" val="2578357902"/>
+      </p:ext>
+    </p:extLst>
+  </p:cSld>
+  <p:clrMapOvr>
+    <a:masterClrMapping/>
+  </p:clrMapOvr>
+</p:notes>
+</file>
+
 <file path=ppt/slideLayouts/slideLayout1.xml><?xml version="1.0" encoding="utf-8"?>
 <p:sldLayout xmlns:a="http://schemas.openxmlformats.org/drawingml/2006/main" xmlns:r="http://schemas.openxmlformats.org/officeDocument/2006/relationships" xmlns:p="http://schemas.openxmlformats.org/presentationml/2006/main" type="title" preserve="1">
   <p:cSld name="Title Slide">
@@ -8715,7 +9176,7 @@
           <a:p>
             <a:fld id="{4263717A-E3C1-4BED-ABE0-B7069385E023}" type="datetimeFigureOut">
               <a:rPr lang="en-US" smtClean="0"/>
-              <a:t>4/15/2025</a:t>
+              <a:t>4/23/2025</a:t>
             </a:fld>
             <a:endParaRPr lang="en-US"/>
           </a:p>
@@ -8888,7 +9349,7 @@
           <a:p>
             <a:fld id="{4263717A-E3C1-4BED-ABE0-B7069385E023}" type="datetimeFigureOut">
               <a:rPr lang="en-US" smtClean="0"/>
-              <a:t>4/15/2025</a:t>
+              <a:t>4/23/2025</a:t>
             </a:fld>
             <a:endParaRPr lang="en-US"/>
           </a:p>
@@ -9066,7 +9527,7 @@
           <a:p>
             <a:fld id="{4263717A-E3C1-4BED-ABE0-B7069385E023}" type="datetimeFigureOut">
               <a:rPr lang="en-US" smtClean="0"/>
-              <a:t>4/15/2025</a:t>
+              <a:t>4/23/2025</a:t>
             </a:fld>
             <a:endParaRPr lang="en-US"/>
           </a:p>
@@ -9234,7 +9695,7 @@
           <a:p>
             <a:fld id="{4263717A-E3C1-4BED-ABE0-B7069385E023}" type="datetimeFigureOut">
               <a:rPr lang="en-US" smtClean="0"/>
-              <a:t>4/15/2025</a:t>
+              <a:t>4/23/2025</a:t>
             </a:fld>
             <a:endParaRPr lang="en-US"/>
           </a:p>
@@ -9479,7 +9940,7 @@
           <a:p>
             <a:fld id="{4263717A-E3C1-4BED-ABE0-B7069385E023}" type="datetimeFigureOut">
               <a:rPr lang="en-US" smtClean="0"/>
-              <a:t>4/15/2025</a:t>
+              <a:t>4/23/2025</a:t>
             </a:fld>
             <a:endParaRPr lang="en-US"/>
           </a:p>
@@ -9708,7 +10169,7 @@
           <a:p>
             <a:fld id="{4263717A-E3C1-4BED-ABE0-B7069385E023}" type="datetimeFigureOut">
               <a:rPr lang="en-US" smtClean="0"/>
-              <a:t>4/15/2025</a:t>
+              <a:t>4/23/2025</a:t>
             </a:fld>
             <a:endParaRPr lang="en-US"/>
           </a:p>
@@ -10072,7 +10533,7 @@
           <a:p>
             <a:fld id="{4263717A-E3C1-4BED-ABE0-B7069385E023}" type="datetimeFigureOut">
               <a:rPr lang="en-US" smtClean="0"/>
-              <a:t>4/15/2025</a:t>
+              <a:t>4/23/2025</a:t>
             </a:fld>
             <a:endParaRPr lang="en-US"/>
           </a:p>
@@ -10189,7 +10650,7 @@
           <a:p>
             <a:fld id="{4263717A-E3C1-4BED-ABE0-B7069385E023}" type="datetimeFigureOut">
               <a:rPr lang="en-US" smtClean="0"/>
-              <a:t>4/15/2025</a:t>
+              <a:t>4/23/2025</a:t>
             </a:fld>
             <a:endParaRPr lang="en-US"/>
           </a:p>
@@ -10284,7 +10745,7 @@
           <a:p>
             <a:fld id="{4263717A-E3C1-4BED-ABE0-B7069385E023}" type="datetimeFigureOut">
               <a:rPr lang="en-US" smtClean="0"/>
-              <a:t>4/15/2025</a:t>
+              <a:t>4/23/2025</a:t>
             </a:fld>
             <a:endParaRPr lang="en-US"/>
           </a:p>
@@ -10559,7 +11020,7 @@
           <a:p>
             <a:fld id="{4263717A-E3C1-4BED-ABE0-B7069385E023}" type="datetimeFigureOut">
               <a:rPr lang="en-US" smtClean="0"/>
-              <a:t>4/15/2025</a:t>
+              <a:t>4/23/2025</a:t>
             </a:fld>
             <a:endParaRPr lang="en-US"/>
           </a:p>
@@ -10811,7 +11272,7 @@
           <a:p>
             <a:fld id="{4263717A-E3C1-4BED-ABE0-B7069385E023}" type="datetimeFigureOut">
               <a:rPr lang="en-US" smtClean="0"/>
-              <a:t>4/15/2025</a:t>
+              <a:t>4/23/2025</a:t>
             </a:fld>
             <a:endParaRPr lang="en-US"/>
           </a:p>
@@ -11022,7 +11483,7 @@
           <a:p>
             <a:fld id="{4263717A-E3C1-4BED-ABE0-B7069385E023}" type="datetimeFigureOut">
               <a:rPr lang="en-US" smtClean="0"/>
-              <a:t>4/15/2025</a:t>
+              <a:t>4/23/2025</a:t>
             </a:fld>
             <a:endParaRPr lang="en-US"/>
           </a:p>
@@ -14324,13 +14785,7 @@
   <p:cSld>
     <p:spTree>
       <p:nvGrpSpPr>
-        <p:cNvPr id="1" name="">
-          <a:extLst>
-            <a:ext uri="{FF2B5EF4-FFF2-40B4-BE49-F238E27FC236}">
-              <a16:creationId xmlns:a16="http://schemas.microsoft.com/office/drawing/2014/main" id="{06360024-3B11-A57D-08D1-0BA714BE5475}"/>
-            </a:ext>
-          </a:extLst>
-        </p:cNvPr>
+        <p:cNvPr id="1" name=""/>
         <p:cNvGrpSpPr/>
         <p:nvPr/>
       </p:nvGrpSpPr>
@@ -14342,72 +14797,40 @@
           <a:chExt cx="0" cy="0"/>
         </a:xfrm>
       </p:grpSpPr>
-      <p:sp>
-        <p:nvSpPr>
-          <p:cNvPr id="4" name="Title 3">
+      <p:pic>
+        <p:nvPicPr>
+          <p:cNvPr id="5" name="Picture 4">
             <a:extLst>
               <a:ext uri="{FF2B5EF4-FFF2-40B4-BE49-F238E27FC236}">
-                <a16:creationId xmlns:a16="http://schemas.microsoft.com/office/drawing/2014/main" id="{153F1245-FE95-FDD1-FA2E-BAD1E2107E13}"/>
+                <a16:creationId xmlns:a16="http://schemas.microsoft.com/office/drawing/2014/main" id="{0B69BCC3-98E6-D667-4594-F40A6AA2898A}"/>
               </a:ext>
             </a:extLst>
           </p:cNvPr>
-          <p:cNvSpPr>
-            <a:spLocks noGrp="1"/>
-          </p:cNvSpPr>
-          <p:nvPr>
-            <p:ph type="title"/>
-          </p:nvPr>
-        </p:nvSpPr>
-        <p:spPr/>
-        <p:txBody>
-          <a:bodyPr/>
-          <a:lstStyle/>
-          <a:p>
-            <a:r>
-              <a:rPr lang="en-US" dirty="0" err="1">
-                <a:solidFill>
-                  <a:schemeClr val="accent2"/>
-                </a:solidFill>
-              </a:rPr>
-              <a:t>dialer.db</a:t>
-            </a:r>
-            <a:endParaRPr lang="en-US" dirty="0">
-              <a:solidFill>
-                <a:schemeClr val="accent2"/>
-              </a:solidFill>
-            </a:endParaRPr>
-          </a:p>
-        </p:txBody>
-      </p:sp>
-      <p:sp>
-        <p:nvSpPr>
-          <p:cNvPr id="5" name="Text Placeholder 4">
-            <a:extLst>
-              <a:ext uri="{FF2B5EF4-FFF2-40B4-BE49-F238E27FC236}">
-                <a16:creationId xmlns:a16="http://schemas.microsoft.com/office/drawing/2014/main" id="{ECD0DB52-2704-4364-2784-569575739577}"/>
-              </a:ext>
-            </a:extLst>
-          </p:cNvPr>
-          <p:cNvSpPr>
-            <a:spLocks noGrp="1"/>
-          </p:cNvSpPr>
-          <p:nvPr>
-            <p:ph type="body" idx="1"/>
-          </p:nvPr>
-        </p:nvSpPr>
-        <p:spPr/>
-        <p:txBody>
-          <a:bodyPr/>
-          <a:lstStyle/>
-          <a:p>
-            <a:endParaRPr lang="en-US"/>
-          </a:p>
-        </p:txBody>
-      </p:sp>
+          <p:cNvPicPr>
+            <a:picLocks noChangeAspect="1"/>
+          </p:cNvPicPr>
+          <p:nvPr/>
+        </p:nvPicPr>
+        <p:blipFill>
+          <a:blip r:embed="rId2"/>
+          <a:stretch>
+            <a:fillRect/>
+          </a:stretch>
+        </p:blipFill>
+        <p:spPr>
+          <a:xfrm>
+            <a:off x="1619573" y="626865"/>
+            <a:ext cx="8400939" cy="5787856"/>
+          </a:xfrm>
+          <a:prstGeom prst="rect">
+            <a:avLst/>
+          </a:prstGeom>
+        </p:spPr>
+      </p:pic>
     </p:spTree>
     <p:extLst>
       <p:ext uri="{BB962C8B-B14F-4D97-AF65-F5344CB8AC3E}">
-        <p14:creationId xmlns:p14="http://schemas.microsoft.com/office/powerpoint/2010/main" val="2089248285"/>
+        <p14:creationId xmlns:p14="http://schemas.microsoft.com/office/powerpoint/2010/main" val="674427553"/>
       </p:ext>
     </p:extLst>
   </p:cSld>
@@ -14501,6 +14924,369 @@
 </file>
 
 <file path=ppt/slides/slide20.xml><?xml version="1.0" encoding="utf-8"?>
+<p:sld xmlns:a="http://schemas.openxmlformats.org/drawingml/2006/main" xmlns:r="http://schemas.openxmlformats.org/officeDocument/2006/relationships" xmlns:p="http://schemas.openxmlformats.org/presentationml/2006/main">
+  <p:cSld>
+    <p:spTree>
+      <p:nvGrpSpPr>
+        <p:cNvPr id="1" name=""/>
+        <p:cNvGrpSpPr/>
+        <p:nvPr/>
+      </p:nvGrpSpPr>
+      <p:grpSpPr>
+        <a:xfrm>
+          <a:off x="0" y="0"/>
+          <a:ext cx="0" cy="0"/>
+          <a:chOff x="0" y="0"/>
+          <a:chExt cx="0" cy="0"/>
+        </a:xfrm>
+      </p:grpSpPr>
+      <p:sp>
+        <p:nvSpPr>
+          <p:cNvPr id="2" name="Title 1">
+            <a:extLst>
+              <a:ext uri="{FF2B5EF4-FFF2-40B4-BE49-F238E27FC236}">
+                <a16:creationId xmlns:a16="http://schemas.microsoft.com/office/drawing/2014/main" id="{935775B0-C8A1-C69F-6DC3-CC0976DAC231}"/>
+              </a:ext>
+            </a:extLst>
+          </p:cNvPr>
+          <p:cNvSpPr>
+            <a:spLocks noGrp="1"/>
+          </p:cNvSpPr>
+          <p:nvPr>
+            <p:ph type="title"/>
+          </p:nvPr>
+        </p:nvSpPr>
+        <p:spPr/>
+        <p:txBody>
+          <a:bodyPr/>
+          <a:lstStyle/>
+          <a:p>
+            <a:r>
+              <a:rPr lang="en-US" dirty="0"/>
+              <a:t>Data sharing between </a:t>
+            </a:r>
+            <a:r>
+              <a:rPr lang="en-US" dirty="0" err="1">
+                <a:solidFill>
+                  <a:schemeClr val="accent2"/>
+                </a:solidFill>
+              </a:rPr>
+              <a:t>calllog.db</a:t>
+            </a:r>
+            <a:r>
+              <a:rPr lang="en-US" dirty="0">
+                <a:solidFill>
+                  <a:schemeClr val="accent2"/>
+                </a:solidFill>
+              </a:rPr>
+              <a:t> </a:t>
+            </a:r>
+            <a:r>
+              <a:rPr lang="en-US" dirty="0"/>
+              <a:t>and </a:t>
+            </a:r>
+            <a:r>
+              <a:rPr lang="en-US" dirty="0" err="1">
+                <a:solidFill>
+                  <a:schemeClr val="accent2"/>
+                </a:solidFill>
+              </a:rPr>
+              <a:t>annotated_call_log.db</a:t>
+            </a:r>
+            <a:endParaRPr lang="en-US" dirty="0">
+              <a:solidFill>
+                <a:schemeClr val="accent2"/>
+              </a:solidFill>
+            </a:endParaRPr>
+          </a:p>
+        </p:txBody>
+      </p:sp>
+      <p:sp>
+        <p:nvSpPr>
+          <p:cNvPr id="3" name="Content Placeholder 2">
+            <a:extLst>
+              <a:ext uri="{FF2B5EF4-FFF2-40B4-BE49-F238E27FC236}">
+                <a16:creationId xmlns:a16="http://schemas.microsoft.com/office/drawing/2014/main" id="{68FDF470-BF87-92FD-26B4-CF9CE27F9631}"/>
+              </a:ext>
+            </a:extLst>
+          </p:cNvPr>
+          <p:cNvSpPr>
+            <a:spLocks noGrp="1"/>
+          </p:cNvSpPr>
+          <p:nvPr>
+            <p:ph idx="1"/>
+          </p:nvPr>
+        </p:nvSpPr>
+        <p:spPr/>
+        <p:txBody>
+          <a:bodyPr>
+            <a:normAutofit fontScale="92500" lnSpcReduction="10000"/>
+          </a:bodyPr>
+          <a:lstStyle/>
+          <a:p>
+            <a:r>
+              <a:rPr lang="en-GB" dirty="0"/>
+              <a:t>Data Sharing:</a:t>
+            </a:r>
+          </a:p>
+          <a:p>
+            <a:pPr lvl="1"/>
+            <a:r>
+              <a:rPr lang="en-GB" dirty="0"/>
+              <a:t>The </a:t>
+            </a:r>
+            <a:r>
+              <a:rPr lang="en-GB" dirty="0">
+                <a:solidFill>
+                  <a:schemeClr val="accent2"/>
+                </a:solidFill>
+              </a:rPr>
+              <a:t>calls</a:t>
+            </a:r>
+            <a:r>
+              <a:rPr lang="en-GB" dirty="0"/>
+              <a:t> table is the authoritative source. The Google </a:t>
+            </a:r>
+            <a:r>
+              <a:rPr lang="en-GB" dirty="0" err="1"/>
+              <a:t>Dialer</a:t>
+            </a:r>
+            <a:r>
+              <a:rPr lang="en-GB" dirty="0"/>
+              <a:t> and other apps read from it, but do not write data from their own databases back to it.</a:t>
+            </a:r>
+          </a:p>
+          <a:p>
+            <a:pPr lvl="1"/>
+            <a:r>
+              <a:rPr lang="en-GB" dirty="0"/>
+              <a:t>The </a:t>
+            </a:r>
+            <a:r>
+              <a:rPr lang="en-GB" dirty="0" err="1">
+                <a:solidFill>
+                  <a:schemeClr val="accent2"/>
+                </a:solidFill>
+              </a:rPr>
+              <a:t>annotated_calllog</a:t>
+            </a:r>
+            <a:r>
+              <a:rPr lang="en-GB" dirty="0">
+                <a:solidFill>
+                  <a:schemeClr val="accent2"/>
+                </a:solidFill>
+              </a:rPr>
+              <a:t> </a:t>
+            </a:r>
+            <a:r>
+              <a:rPr lang="en-GB" dirty="0"/>
+              <a:t>table is a copy/subset of recent entries from the system call log, enhanced with app-specific annotations.</a:t>
+            </a:r>
+          </a:p>
+          <a:p>
+            <a:r>
+              <a:rPr lang="en-GB" dirty="0"/>
+              <a:t>Synchronization:</a:t>
+            </a:r>
+          </a:p>
+          <a:p>
+            <a:pPr lvl="1"/>
+            <a:r>
+              <a:rPr lang="en-GB" dirty="0"/>
+              <a:t>There is no automatic, two-way synchronization between the two databases.</a:t>
+            </a:r>
+          </a:p>
+          <a:p>
+            <a:pPr lvl="1"/>
+            <a:r>
+              <a:rPr lang="en-GB" dirty="0"/>
+              <a:t>The Google </a:t>
+            </a:r>
+            <a:r>
+              <a:rPr lang="en-GB" dirty="0" err="1"/>
+              <a:t>Dialer</a:t>
+            </a:r>
+            <a:r>
+              <a:rPr lang="en-GB" dirty="0"/>
+              <a:t> app periodically reads new entries from the system call log and updates its own </a:t>
+            </a:r>
+            <a:r>
+              <a:rPr lang="en-GB" dirty="0" err="1">
+                <a:solidFill>
+                  <a:schemeClr val="accent2"/>
+                </a:solidFill>
+              </a:rPr>
+              <a:t>annotated_calllog</a:t>
+            </a:r>
+            <a:r>
+              <a:rPr lang="en-GB" dirty="0">
+                <a:solidFill>
+                  <a:schemeClr val="accent2"/>
+                </a:solidFill>
+              </a:rPr>
+              <a:t> </a:t>
+            </a:r>
+            <a:r>
+              <a:rPr lang="en-GB" dirty="0"/>
+              <a:t>table as needed.</a:t>
+            </a:r>
+          </a:p>
+          <a:p>
+            <a:r>
+              <a:rPr lang="en-GB" dirty="0"/>
+              <a:t>No foreign key in either table that references the other table’s primary key.</a:t>
+            </a:r>
+          </a:p>
+          <a:p>
+            <a:pPr lvl="1"/>
+            <a:r>
+              <a:rPr lang="en-GB" dirty="0"/>
+              <a:t>The </a:t>
+            </a:r>
+            <a:r>
+              <a:rPr lang="en-GB" dirty="0" err="1">
+                <a:solidFill>
+                  <a:schemeClr val="accent2"/>
+                </a:solidFill>
+              </a:rPr>
+              <a:t>annotated_calllog</a:t>
+            </a:r>
+            <a:r>
+              <a:rPr lang="en-GB" dirty="0">
+                <a:solidFill>
+                  <a:schemeClr val="accent2"/>
+                </a:solidFill>
+              </a:rPr>
+              <a:t> </a:t>
+            </a:r>
+            <a:r>
+              <a:rPr lang="en-GB" dirty="0"/>
+              <a:t>table is populated by the Google </a:t>
+            </a:r>
+            <a:r>
+              <a:rPr lang="en-GB" dirty="0" err="1"/>
+              <a:t>Dialer</a:t>
+            </a:r>
+            <a:r>
+              <a:rPr lang="en-GB" dirty="0"/>
+              <a:t> app reading data from the system calls table and copying relevant fields, but this is done at the application logic level, not via database-enforced foreign key constraints.</a:t>
+            </a:r>
+            <a:endParaRPr lang="en-US" dirty="0"/>
+          </a:p>
+        </p:txBody>
+      </p:sp>
+    </p:spTree>
+    <p:extLst>
+      <p:ext uri="{BB962C8B-B14F-4D97-AF65-F5344CB8AC3E}">
+        <p14:creationId xmlns:p14="http://schemas.microsoft.com/office/powerpoint/2010/main" val="792115356"/>
+      </p:ext>
+    </p:extLst>
+  </p:cSld>
+  <p:clrMapOvr>
+    <a:masterClrMapping/>
+  </p:clrMapOvr>
+</p:sld>
+</file>
+
+<file path=ppt/slides/slide21.xml><?xml version="1.0" encoding="utf-8"?>
+<p:sld xmlns:a="http://schemas.openxmlformats.org/drawingml/2006/main" xmlns:r="http://schemas.openxmlformats.org/officeDocument/2006/relationships" xmlns:p="http://schemas.openxmlformats.org/presentationml/2006/main">
+  <p:cSld>
+    <p:spTree>
+      <p:nvGrpSpPr>
+        <p:cNvPr id="1" name="">
+          <a:extLst>
+            <a:ext uri="{FF2B5EF4-FFF2-40B4-BE49-F238E27FC236}">
+              <a16:creationId xmlns:a16="http://schemas.microsoft.com/office/drawing/2014/main" id="{06360024-3B11-A57D-08D1-0BA714BE5475}"/>
+            </a:ext>
+          </a:extLst>
+        </p:cNvPr>
+        <p:cNvGrpSpPr/>
+        <p:nvPr/>
+      </p:nvGrpSpPr>
+      <p:grpSpPr>
+        <a:xfrm>
+          <a:off x="0" y="0"/>
+          <a:ext cx="0" cy="0"/>
+          <a:chOff x="0" y="0"/>
+          <a:chExt cx="0" cy="0"/>
+        </a:xfrm>
+      </p:grpSpPr>
+      <p:sp>
+        <p:nvSpPr>
+          <p:cNvPr id="4" name="Title 3">
+            <a:extLst>
+              <a:ext uri="{FF2B5EF4-FFF2-40B4-BE49-F238E27FC236}">
+                <a16:creationId xmlns:a16="http://schemas.microsoft.com/office/drawing/2014/main" id="{153F1245-FE95-FDD1-FA2E-BAD1E2107E13}"/>
+              </a:ext>
+            </a:extLst>
+          </p:cNvPr>
+          <p:cNvSpPr>
+            <a:spLocks noGrp="1"/>
+          </p:cNvSpPr>
+          <p:nvPr>
+            <p:ph type="title"/>
+          </p:nvPr>
+        </p:nvSpPr>
+        <p:spPr/>
+        <p:txBody>
+          <a:bodyPr/>
+          <a:lstStyle/>
+          <a:p>
+            <a:r>
+              <a:rPr lang="en-US" dirty="0" err="1">
+                <a:solidFill>
+                  <a:schemeClr val="accent2"/>
+                </a:solidFill>
+              </a:rPr>
+              <a:t>dialer.db</a:t>
+            </a:r>
+            <a:endParaRPr lang="en-US" dirty="0">
+              <a:solidFill>
+                <a:schemeClr val="accent2"/>
+              </a:solidFill>
+            </a:endParaRPr>
+          </a:p>
+        </p:txBody>
+      </p:sp>
+      <p:sp>
+        <p:nvSpPr>
+          <p:cNvPr id="5" name="Text Placeholder 4">
+            <a:extLst>
+              <a:ext uri="{FF2B5EF4-FFF2-40B4-BE49-F238E27FC236}">
+                <a16:creationId xmlns:a16="http://schemas.microsoft.com/office/drawing/2014/main" id="{ECD0DB52-2704-4364-2784-569575739577}"/>
+              </a:ext>
+            </a:extLst>
+          </p:cNvPr>
+          <p:cNvSpPr>
+            <a:spLocks noGrp="1"/>
+          </p:cNvSpPr>
+          <p:nvPr>
+            <p:ph type="body" idx="1"/>
+          </p:nvPr>
+        </p:nvSpPr>
+        <p:spPr/>
+        <p:txBody>
+          <a:bodyPr/>
+          <a:lstStyle/>
+          <a:p>
+            <a:endParaRPr lang="en-US"/>
+          </a:p>
+        </p:txBody>
+      </p:sp>
+    </p:spTree>
+    <p:extLst>
+      <p:ext uri="{BB962C8B-B14F-4D97-AF65-F5344CB8AC3E}">
+        <p14:creationId xmlns:p14="http://schemas.microsoft.com/office/powerpoint/2010/main" val="2089248285"/>
+      </p:ext>
+    </p:extLst>
+  </p:cSld>
+  <p:clrMapOvr>
+    <a:masterClrMapping/>
+  </p:clrMapOvr>
+</p:sld>
+</file>
+
+<file path=ppt/slides/slide22.xml><?xml version="1.0" encoding="utf-8"?>
 <p:sld xmlns:a="http://schemas.openxmlformats.org/drawingml/2006/main" xmlns:r="http://schemas.openxmlformats.org/officeDocument/2006/relationships" xmlns:p="http://schemas.openxmlformats.org/presentationml/2006/main">
   <p:cSld>
     <p:spTree>
@@ -14801,7 +15587,7 @@
 </p:sld>
 </file>
 
-<file path=ppt/slides/slide21.xml><?xml version="1.0" encoding="utf-8"?>
+<file path=ppt/slides/slide23.xml><?xml version="1.0" encoding="utf-8"?>
 <p:sld xmlns:a="http://schemas.openxmlformats.org/drawingml/2006/main" xmlns:r="http://schemas.openxmlformats.org/officeDocument/2006/relationships" xmlns:p="http://schemas.openxmlformats.org/presentationml/2006/main">
   <p:cSld>
     <p:spTree>
@@ -14931,7 +15717,7 @@
 </p:sld>
 </file>
 
-<file path=ppt/slides/slide22.xml><?xml version="1.0" encoding="utf-8"?>
+<file path=ppt/slides/slide24.xml><?xml version="1.0" encoding="utf-8"?>
 <p:sld xmlns:a="http://schemas.openxmlformats.org/drawingml/2006/main" xmlns:r="http://schemas.openxmlformats.org/officeDocument/2006/relationships" xmlns:p="http://schemas.openxmlformats.org/presentationml/2006/main">
   <p:cSld>
     <p:spTree>
@@ -15029,7 +15815,7 @@
 </p:sld>
 </file>
 
-<file path=ppt/slides/slide23.xml><?xml version="1.0" encoding="utf-8"?>
+<file path=ppt/slides/slide25.xml><?xml version="1.0" encoding="utf-8"?>
 <p:sld xmlns:a="http://schemas.openxmlformats.org/drawingml/2006/main" xmlns:r="http://schemas.openxmlformats.org/officeDocument/2006/relationships" xmlns:p="http://schemas.openxmlformats.org/presentationml/2006/main">
   <p:cSld>
     <p:spTree>
@@ -15162,7 +15948,7 @@
 </p:sld>
 </file>
 
-<file path=ppt/slides/slide24.xml><?xml version="1.0" encoding="utf-8"?>
+<file path=ppt/slides/slide26.xml><?xml version="1.0" encoding="utf-8"?>
 <p:sld xmlns:a="http://schemas.openxmlformats.org/drawingml/2006/main" xmlns:r="http://schemas.openxmlformats.org/officeDocument/2006/relationships" xmlns:p="http://schemas.openxmlformats.org/presentationml/2006/main">
   <p:cSld>
     <p:spTree>
@@ -15382,7 +16168,7 @@
 </p:sld>
 </file>
 
-<file path=ppt/slides/slide25.xml><?xml version="1.0" encoding="utf-8"?>
+<file path=ppt/slides/slide27.xml><?xml version="1.0" encoding="utf-8"?>
 <p:sld xmlns:a="http://schemas.openxmlformats.org/drawingml/2006/main" xmlns:r="http://schemas.openxmlformats.org/officeDocument/2006/relationships" xmlns:p="http://schemas.openxmlformats.org/presentationml/2006/main">
   <p:cSld>
     <p:spTree>
@@ -15480,7 +16266,7 @@
 </p:sld>
 </file>
 
-<file path=ppt/slides/slide26.xml><?xml version="1.0" encoding="utf-8"?>
+<file path=ppt/slides/slide28.xml><?xml version="1.0" encoding="utf-8"?>
 <p:sld xmlns:a="http://schemas.openxmlformats.org/drawingml/2006/main" xmlns:r="http://schemas.openxmlformats.org/officeDocument/2006/relationships" xmlns:p="http://schemas.openxmlformats.org/presentationml/2006/main">
   <p:cSld>
     <p:spTree>
@@ -15588,14 +16374,14 @@
             <a:pPr lvl="1"/>
             <a:r>
               <a:rPr lang="en-GB" dirty="0"/>
-              <a:t> Allows the app to quickly retrieve the same information if the same number calls again</a:t>
+              <a:t>Allows the app to quickly retrieve the same information if the same number calls again</a:t>
             </a:r>
           </a:p>
           <a:p>
             <a:pPr lvl="1"/>
             <a:r>
               <a:rPr lang="en-GB" dirty="0"/>
-              <a:t> Reducing the need for repeated server queries and improving performance.</a:t>
+              <a:t>Reducing the need for repeated server queries and improving performance.</a:t>
             </a:r>
             <a:endParaRPr lang="en-US" dirty="0"/>
           </a:p>
@@ -15644,7 +16430,7 @@
 </p:sld>
 </file>
 
-<file path=ppt/slides/slide27.xml><?xml version="1.0" encoding="utf-8"?>
+<file path=ppt/slides/slide29.xml><?xml version="1.0" encoding="utf-8"?>
 <p:sld xmlns:a="http://schemas.openxmlformats.org/drawingml/2006/main" xmlns:r="http://schemas.openxmlformats.org/officeDocument/2006/relationships" xmlns:p="http://schemas.openxmlformats.org/presentationml/2006/main">
   <p:cSld>
     <p:spTree>
@@ -15683,7 +16469,7 @@
         </p:blipFill>
         <p:spPr>
           <a:xfrm>
-            <a:off x="851089" y="1227130"/>
+            <a:off x="1176554" y="2312011"/>
             <a:ext cx="9999538" cy="581791"/>
           </a:xfrm>
           <a:prstGeom prst="rect">
@@ -15713,38 +16499,8 @@
         </p:blipFill>
         <p:spPr>
           <a:xfrm>
-            <a:off x="851089" y="1808921"/>
+            <a:off x="1176554" y="2893802"/>
             <a:ext cx="7866620" cy="1576661"/>
-          </a:xfrm>
-          <a:prstGeom prst="rect">
-            <a:avLst/>
-          </a:prstGeom>
-        </p:spPr>
-      </p:pic>
-      <p:pic>
-        <p:nvPicPr>
-          <p:cNvPr id="9" name="Picture 8" descr="Graphical user interface&#10;&#10;Description automatically generated">
-            <a:extLst>
-              <a:ext uri="{FF2B5EF4-FFF2-40B4-BE49-F238E27FC236}">
-                <a16:creationId xmlns:a16="http://schemas.microsoft.com/office/drawing/2014/main" id="{B6516974-8E35-4D9E-8B52-0F9861769110}"/>
-              </a:ext>
-            </a:extLst>
-          </p:cNvPr>
-          <p:cNvPicPr>
-            <a:picLocks noChangeAspect="1"/>
-          </p:cNvPicPr>
-          <p:nvPr/>
-        </p:nvPicPr>
-        <p:blipFill>
-          <a:blip r:embed="rId4"/>
-          <a:stretch>
-            <a:fillRect/>
-          </a:stretch>
-        </p:blipFill>
-        <p:spPr>
-          <a:xfrm>
-            <a:off x="851089" y="3992396"/>
-            <a:ext cx="4778154" cy="1905165"/>
           </a:xfrm>
           <a:prstGeom prst="rect">
             <a:avLst/>
@@ -15765,7 +16521,7 @@
         </p:nvSpPr>
         <p:spPr>
           <a:xfrm>
-            <a:off x="851089" y="845023"/>
+            <a:off x="1176554" y="1929904"/>
             <a:ext cx="3227615" cy="369332"/>
           </a:xfrm>
           <a:prstGeom prst="rect">
@@ -15801,273 +16557,10 @@
           </a:p>
         </p:txBody>
       </p:sp>
-      <p:sp>
-        <p:nvSpPr>
-          <p:cNvPr id="11" name="TextBox 10">
-            <a:extLst>
-              <a:ext uri="{FF2B5EF4-FFF2-40B4-BE49-F238E27FC236}">
-                <a16:creationId xmlns:a16="http://schemas.microsoft.com/office/drawing/2014/main" id="{884103A9-E37C-4959-A633-0363560DA7CE}"/>
-              </a:ext>
-            </a:extLst>
-          </p:cNvPr>
-          <p:cNvSpPr txBox="1"/>
-          <p:nvPr/>
-        </p:nvSpPr>
-        <p:spPr>
-          <a:xfrm>
-            <a:off x="851089" y="3623064"/>
-            <a:ext cx="2356222" cy="369332"/>
-          </a:xfrm>
-          <a:prstGeom prst="rect">
-            <a:avLst/>
-          </a:prstGeom>
-          <a:solidFill>
-            <a:schemeClr val="accent4"/>
-          </a:solidFill>
-        </p:spPr>
-        <p:txBody>
-          <a:bodyPr wrap="none" rtlCol="0">
-            <a:spAutoFit/>
-          </a:bodyPr>
-          <a:lstStyle/>
-          <a:p>
-            <a:r>
-              <a:rPr lang="en-US" dirty="0"/>
-              <a:t>Two contacts are saved</a:t>
-            </a:r>
-            <a:endParaRPr lang="en-US" i="1" dirty="0">
-              <a:solidFill>
-                <a:srgbClr val="7030A0"/>
-              </a:solidFill>
-            </a:endParaRPr>
-          </a:p>
-        </p:txBody>
-      </p:sp>
     </p:spTree>
     <p:extLst>
       <p:ext uri="{BB962C8B-B14F-4D97-AF65-F5344CB8AC3E}">
         <p14:creationId xmlns:p14="http://schemas.microsoft.com/office/powerpoint/2010/main" val="1495699096"/>
-      </p:ext>
-    </p:extLst>
-  </p:cSld>
-  <p:clrMapOvr>
-    <a:masterClrMapping/>
-  </p:clrMapOvr>
-</p:sld>
-</file>
-
-<file path=ppt/slides/slide28.xml><?xml version="1.0" encoding="utf-8"?>
-<p:sld xmlns:a="http://schemas.openxmlformats.org/drawingml/2006/main" xmlns:r="http://schemas.openxmlformats.org/officeDocument/2006/relationships" xmlns:p="http://schemas.openxmlformats.org/presentationml/2006/main">
-  <p:cSld>
-    <p:spTree>
-      <p:nvGrpSpPr>
-        <p:cNvPr id="1" name="">
-          <a:extLst>
-            <a:ext uri="{FF2B5EF4-FFF2-40B4-BE49-F238E27FC236}">
-              <a16:creationId xmlns:a16="http://schemas.microsoft.com/office/drawing/2014/main" id="{55665620-7871-5B67-797F-4D7F6F6433A0}"/>
-            </a:ext>
-          </a:extLst>
-        </p:cNvPr>
-        <p:cNvGrpSpPr/>
-        <p:nvPr/>
-      </p:nvGrpSpPr>
-      <p:grpSpPr>
-        <a:xfrm>
-          <a:off x="0" y="0"/>
-          <a:ext cx="0" cy="0"/>
-          <a:chOff x="0" y="0"/>
-          <a:chExt cx="0" cy="0"/>
-        </a:xfrm>
-      </p:grpSpPr>
-      <p:sp>
-        <p:nvSpPr>
-          <p:cNvPr id="4" name="Title 3">
-            <a:extLst>
-              <a:ext uri="{FF2B5EF4-FFF2-40B4-BE49-F238E27FC236}">
-                <a16:creationId xmlns:a16="http://schemas.microsoft.com/office/drawing/2014/main" id="{84C29BEA-A4BA-50A6-F384-78E18FAC007D}"/>
-              </a:ext>
-            </a:extLst>
-          </p:cNvPr>
-          <p:cNvSpPr>
-            <a:spLocks noGrp="1"/>
-          </p:cNvSpPr>
-          <p:nvPr>
-            <p:ph type="title"/>
-          </p:nvPr>
-        </p:nvSpPr>
-        <p:spPr/>
-        <p:txBody>
-          <a:bodyPr/>
-          <a:lstStyle/>
-          <a:p>
-            <a:r>
-              <a:rPr lang="en-GB" dirty="0" err="1">
-                <a:solidFill>
-                  <a:schemeClr val="accent2"/>
-                </a:solidFill>
-              </a:rPr>
-              <a:t>voicemail.db</a:t>
-            </a:r>
-            <a:endParaRPr lang="en-US" dirty="0">
-              <a:solidFill>
-                <a:schemeClr val="accent2"/>
-              </a:solidFill>
-            </a:endParaRPr>
-          </a:p>
-        </p:txBody>
-      </p:sp>
-      <p:sp>
-        <p:nvSpPr>
-          <p:cNvPr id="5" name="Text Placeholder 4">
-            <a:extLst>
-              <a:ext uri="{FF2B5EF4-FFF2-40B4-BE49-F238E27FC236}">
-                <a16:creationId xmlns:a16="http://schemas.microsoft.com/office/drawing/2014/main" id="{0B18FC7F-0826-79A1-93FE-29328D546C25}"/>
-              </a:ext>
-            </a:extLst>
-          </p:cNvPr>
-          <p:cNvSpPr>
-            <a:spLocks noGrp="1"/>
-          </p:cNvSpPr>
-          <p:nvPr>
-            <p:ph type="body" idx="1"/>
-          </p:nvPr>
-        </p:nvSpPr>
-        <p:spPr/>
-        <p:txBody>
-          <a:bodyPr/>
-          <a:lstStyle/>
-          <a:p>
-            <a:endParaRPr lang="en-US"/>
-          </a:p>
-        </p:txBody>
-      </p:sp>
-    </p:spTree>
-    <p:extLst>
-      <p:ext uri="{BB962C8B-B14F-4D97-AF65-F5344CB8AC3E}">
-        <p14:creationId xmlns:p14="http://schemas.microsoft.com/office/powerpoint/2010/main" val="2573116480"/>
-      </p:ext>
-    </p:extLst>
-  </p:cSld>
-  <p:clrMapOvr>
-    <a:masterClrMapping/>
-  </p:clrMapOvr>
-</p:sld>
-</file>
-
-<file path=ppt/slides/slide29.xml><?xml version="1.0" encoding="utf-8"?>
-<p:sld xmlns:a="http://schemas.openxmlformats.org/drawingml/2006/main" xmlns:r="http://schemas.openxmlformats.org/officeDocument/2006/relationships" xmlns:p="http://schemas.openxmlformats.org/presentationml/2006/main">
-  <p:cSld>
-    <p:spTree>
-      <p:nvGrpSpPr>
-        <p:cNvPr id="1" name=""/>
-        <p:cNvGrpSpPr/>
-        <p:nvPr/>
-      </p:nvGrpSpPr>
-      <p:grpSpPr>
-        <a:xfrm>
-          <a:off x="0" y="0"/>
-          <a:ext cx="0" cy="0"/>
-          <a:chOff x="0" y="0"/>
-          <a:chExt cx="0" cy="0"/>
-        </a:xfrm>
-      </p:grpSpPr>
-      <p:sp>
-        <p:nvSpPr>
-          <p:cNvPr id="2" name="Title 1">
-            <a:extLst>
-              <a:ext uri="{FF2B5EF4-FFF2-40B4-BE49-F238E27FC236}">
-                <a16:creationId xmlns:a16="http://schemas.microsoft.com/office/drawing/2014/main" id="{84AAD71E-1D63-4FE9-8A2D-A3C04021473A}"/>
-              </a:ext>
-            </a:extLst>
-          </p:cNvPr>
-          <p:cNvSpPr>
-            <a:spLocks noGrp="1"/>
-          </p:cNvSpPr>
-          <p:nvPr>
-            <p:ph type="title"/>
-          </p:nvPr>
-        </p:nvSpPr>
-        <p:spPr/>
-        <p:txBody>
-          <a:bodyPr/>
-          <a:lstStyle/>
-          <a:p>
-            <a:r>
-              <a:rPr lang="en-US" dirty="0"/>
-              <a:t>What is the greeting message?</a:t>
-            </a:r>
-          </a:p>
-        </p:txBody>
-      </p:sp>
-      <p:sp>
-        <p:nvSpPr>
-          <p:cNvPr id="3" name="Content Placeholder 2">
-            <a:extLst>
-              <a:ext uri="{FF2B5EF4-FFF2-40B4-BE49-F238E27FC236}">
-                <a16:creationId xmlns:a16="http://schemas.microsoft.com/office/drawing/2014/main" id="{C7D96ACB-A16D-4162-A340-47BFCF3CAD6A}"/>
-              </a:ext>
-            </a:extLst>
-          </p:cNvPr>
-          <p:cNvSpPr>
-            <a:spLocks noGrp="1"/>
-          </p:cNvSpPr>
-          <p:nvPr>
-            <p:ph idx="1"/>
-          </p:nvPr>
-        </p:nvSpPr>
-        <p:spPr>
-          <a:xfrm>
-            <a:off x="838200" y="1825625"/>
-            <a:ext cx="10515600" cy="636838"/>
-          </a:xfrm>
-        </p:spPr>
-        <p:txBody>
-          <a:bodyPr>
-            <a:normAutofit fontScale="85000" lnSpcReduction="20000"/>
-          </a:bodyPr>
-          <a:lstStyle/>
-          <a:p>
-            <a:r>
-              <a:rPr lang="en-US" dirty="0"/>
-              <a:t>The owner often provides greeting message. Did the owner use a greeting message?</a:t>
-            </a:r>
-          </a:p>
-        </p:txBody>
-      </p:sp>
-      <p:pic>
-        <p:nvPicPr>
-          <p:cNvPr id="5" name="Picture 4" descr="Text&#10;&#10;Description automatically generated">
-            <a:extLst>
-              <a:ext uri="{FF2B5EF4-FFF2-40B4-BE49-F238E27FC236}">
-                <a16:creationId xmlns:a16="http://schemas.microsoft.com/office/drawing/2014/main" id="{DE102491-6098-4C0F-8CDF-2ECB8C93DD1C}"/>
-              </a:ext>
-            </a:extLst>
-          </p:cNvPr>
-          <p:cNvPicPr>
-            <a:picLocks noChangeAspect="1"/>
-          </p:cNvPicPr>
-          <p:nvPr/>
-        </p:nvPicPr>
-        <p:blipFill>
-          <a:blip r:embed="rId2"/>
-          <a:stretch>
-            <a:fillRect/>
-          </a:stretch>
-        </p:blipFill>
-        <p:spPr>
-          <a:xfrm>
-            <a:off x="1037854" y="2735179"/>
-            <a:ext cx="7514844" cy="3684130"/>
-          </a:xfrm>
-          <a:prstGeom prst="rect">
-            <a:avLst/>
-          </a:prstGeom>
-        </p:spPr>
-      </p:pic>
-    </p:spTree>
-    <p:extLst>
-      <p:ext uri="{BB962C8B-B14F-4D97-AF65-F5344CB8AC3E}">
-        <p14:creationId xmlns:p14="http://schemas.microsoft.com/office/powerpoint/2010/main" val="4195252170"/>
       </p:ext>
     </p:extLst>
   </p:cSld>
@@ -16220,6 +16713,553 @@
 </file>
 
 <file path=ppt/slides/slide30.xml><?xml version="1.0" encoding="utf-8"?>
+<p:sld xmlns:a="http://schemas.openxmlformats.org/drawingml/2006/main" xmlns:r="http://schemas.openxmlformats.org/officeDocument/2006/relationships" xmlns:p="http://schemas.openxmlformats.org/presentationml/2006/main">
+  <p:cSld>
+    <p:spTree>
+      <p:nvGrpSpPr>
+        <p:cNvPr id="1" name="">
+          <a:extLst>
+            <a:ext uri="{FF2B5EF4-FFF2-40B4-BE49-F238E27FC236}">
+              <a16:creationId xmlns:a16="http://schemas.microsoft.com/office/drawing/2014/main" id="{1E4FBED3-F245-F70A-74E7-D15210240AE7}"/>
+            </a:ext>
+          </a:extLst>
+        </p:cNvPr>
+        <p:cNvGrpSpPr/>
+        <p:nvPr/>
+      </p:nvGrpSpPr>
+      <p:grpSpPr>
+        <a:xfrm>
+          <a:off x="0" y="0"/>
+          <a:ext cx="0" cy="0"/>
+          <a:chOff x="0" y="0"/>
+          <a:chExt cx="0" cy="0"/>
+        </a:xfrm>
+      </p:grpSpPr>
+      <p:pic>
+        <p:nvPicPr>
+          <p:cNvPr id="9" name="Picture 8" descr="Graphical user interface&#10;&#10;Description automatically generated">
+            <a:extLst>
+              <a:ext uri="{FF2B5EF4-FFF2-40B4-BE49-F238E27FC236}">
+                <a16:creationId xmlns:a16="http://schemas.microsoft.com/office/drawing/2014/main" id="{AD71472D-94CF-FDF2-3A98-2B1BA51E1DA8}"/>
+              </a:ext>
+            </a:extLst>
+          </p:cNvPr>
+          <p:cNvPicPr>
+            <a:picLocks noChangeAspect="1"/>
+          </p:cNvPicPr>
+          <p:nvPr/>
+        </p:nvPicPr>
+        <p:blipFill>
+          <a:blip r:embed="rId2"/>
+          <a:srcRect r="25208"/>
+          <a:stretch/>
+        </p:blipFill>
+        <p:spPr>
+          <a:xfrm>
+            <a:off x="8553746" y="0"/>
+            <a:ext cx="3573677" cy="1905165"/>
+          </a:xfrm>
+          <a:prstGeom prst="rect">
+            <a:avLst/>
+          </a:prstGeom>
+        </p:spPr>
+      </p:pic>
+      <p:sp>
+        <p:nvSpPr>
+          <p:cNvPr id="2" name="Title 1">
+            <a:extLst>
+              <a:ext uri="{FF2B5EF4-FFF2-40B4-BE49-F238E27FC236}">
+                <a16:creationId xmlns:a16="http://schemas.microsoft.com/office/drawing/2014/main" id="{E77662BB-5E19-1844-09CE-C040110E0FC5}"/>
+              </a:ext>
+            </a:extLst>
+          </p:cNvPr>
+          <p:cNvSpPr>
+            <a:spLocks noGrp="1"/>
+          </p:cNvSpPr>
+          <p:nvPr>
+            <p:ph type="title"/>
+          </p:nvPr>
+        </p:nvSpPr>
+        <p:spPr/>
+        <p:txBody>
+          <a:bodyPr/>
+          <a:lstStyle/>
+          <a:p>
+            <a:r>
+              <a:rPr lang="en-US" dirty="0" err="1">
+                <a:solidFill>
+                  <a:schemeClr val="accent2"/>
+                </a:solidFill>
+              </a:rPr>
+              <a:t>PhoneLookupHistory</a:t>
+            </a:r>
+            <a:r>
+              <a:rPr lang="en-US" dirty="0"/>
+              <a:t> table</a:t>
+            </a:r>
+          </a:p>
+        </p:txBody>
+      </p:sp>
+      <p:sp>
+        <p:nvSpPr>
+          <p:cNvPr id="6" name="Content Placeholder 5">
+            <a:extLst>
+              <a:ext uri="{FF2B5EF4-FFF2-40B4-BE49-F238E27FC236}">
+                <a16:creationId xmlns:a16="http://schemas.microsoft.com/office/drawing/2014/main" id="{CAD5851A-A011-5D7C-F84D-94BC70EEB92D}"/>
+              </a:ext>
+            </a:extLst>
+          </p:cNvPr>
+          <p:cNvSpPr>
+            <a:spLocks noGrp="1"/>
+          </p:cNvSpPr>
+          <p:nvPr>
+            <p:ph idx="1"/>
+          </p:nvPr>
+        </p:nvSpPr>
+        <p:spPr/>
+        <p:txBody>
+          <a:bodyPr>
+            <a:normAutofit/>
+          </a:bodyPr>
+          <a:lstStyle/>
+          <a:p>
+            <a:r>
+              <a:rPr lang="en-US" dirty="0" err="1">
+                <a:solidFill>
+                  <a:schemeClr val="accent2"/>
+                </a:solidFill>
+              </a:rPr>
+              <a:t>normalized_number</a:t>
+            </a:r>
+            <a:r>
+              <a:rPr lang="en-US" dirty="0">
+                <a:solidFill>
+                  <a:schemeClr val="accent2"/>
+                </a:solidFill>
+              </a:rPr>
+              <a:t>: </a:t>
+            </a:r>
+            <a:r>
+              <a:rPr lang="en-GB" dirty="0"/>
+              <a:t>stores the phone number in a standardized (normalized) format</a:t>
+            </a:r>
+            <a:endParaRPr lang="en-US" dirty="0"/>
+          </a:p>
+          <a:p>
+            <a:r>
+              <a:rPr lang="en-GB" dirty="0" err="1">
+                <a:solidFill>
+                  <a:schemeClr val="accent2"/>
+                </a:solidFill>
+              </a:rPr>
+              <a:t>phone_lookup_info</a:t>
+            </a:r>
+            <a:r>
+              <a:rPr lang="en-GB" dirty="0">
+                <a:solidFill>
+                  <a:schemeClr val="accent2"/>
+                </a:solidFill>
+              </a:rPr>
+              <a:t>:  </a:t>
+            </a:r>
+            <a:r>
+              <a:rPr lang="en-GB" dirty="0"/>
+              <a:t>stores the lookup information associated with the phone number. </a:t>
+            </a:r>
+          </a:p>
+          <a:p>
+            <a:pPr lvl="1"/>
+            <a:r>
+              <a:rPr lang="en-GB" dirty="0"/>
+              <a:t>Stored as a Binary Large Object (BLOB) </a:t>
+            </a:r>
+          </a:p>
+          <a:p>
+            <a:pPr lvl="2"/>
+            <a:r>
+              <a:rPr lang="en-GB" dirty="0"/>
+              <a:t>Structured data in a format like Protocol Buffers, JSON, or a custom binary format, which is then deserialized by the application.</a:t>
+            </a:r>
+          </a:p>
+          <a:p>
+            <a:pPr lvl="1"/>
+            <a:r>
+              <a:rPr lang="en-GB" dirty="0"/>
+              <a:t>The actual content could include:</a:t>
+            </a:r>
+          </a:p>
+          <a:p>
+            <a:pPr lvl="2"/>
+            <a:r>
+              <a:rPr lang="en-GB" dirty="0"/>
+              <a:t>Caller details (e.g., name, carrier, location).</a:t>
+            </a:r>
+          </a:p>
+          <a:p>
+            <a:pPr lvl="2"/>
+            <a:r>
+              <a:rPr lang="en-GB" dirty="0"/>
+              <a:t>Metadata about the lookup (e.g., source of the data, confidence score).</a:t>
+            </a:r>
+          </a:p>
+          <a:p>
+            <a:endParaRPr lang="en-US" dirty="0"/>
+          </a:p>
+        </p:txBody>
+      </p:sp>
+    </p:spTree>
+    <p:extLst>
+      <p:ext uri="{BB962C8B-B14F-4D97-AF65-F5344CB8AC3E}">
+        <p14:creationId xmlns:p14="http://schemas.microsoft.com/office/powerpoint/2010/main" val="204470065"/>
+      </p:ext>
+    </p:extLst>
+  </p:cSld>
+  <p:clrMapOvr>
+    <a:masterClrMapping/>
+  </p:clrMapOvr>
+</p:sld>
+</file>
+
+<file path=ppt/slides/slide31.xml><?xml version="1.0" encoding="utf-8"?>
+<p:sld xmlns:a="http://schemas.openxmlformats.org/drawingml/2006/main" xmlns:r="http://schemas.openxmlformats.org/officeDocument/2006/relationships" xmlns:p="http://schemas.openxmlformats.org/presentationml/2006/main">
+  <p:cSld>
+    <p:spTree>
+      <p:nvGrpSpPr>
+        <p:cNvPr id="1" name=""/>
+        <p:cNvGrpSpPr/>
+        <p:nvPr/>
+      </p:nvGrpSpPr>
+      <p:grpSpPr>
+        <a:xfrm>
+          <a:off x="0" y="0"/>
+          <a:ext cx="0" cy="0"/>
+          <a:chOff x="0" y="0"/>
+          <a:chExt cx="0" cy="0"/>
+        </a:xfrm>
+      </p:grpSpPr>
+      <p:sp>
+        <p:nvSpPr>
+          <p:cNvPr id="2" name="Title 1">
+            <a:extLst>
+              <a:ext uri="{FF2B5EF4-FFF2-40B4-BE49-F238E27FC236}">
+                <a16:creationId xmlns:a16="http://schemas.microsoft.com/office/drawing/2014/main" id="{F470E545-9371-FF9B-EA3E-4174C4CC30BB}"/>
+              </a:ext>
+            </a:extLst>
+          </p:cNvPr>
+          <p:cNvSpPr>
+            <a:spLocks noGrp="1"/>
+          </p:cNvSpPr>
+          <p:nvPr>
+            <p:ph type="title"/>
+          </p:nvPr>
+        </p:nvSpPr>
+        <p:spPr/>
+        <p:txBody>
+          <a:bodyPr/>
+          <a:lstStyle/>
+          <a:p>
+            <a:r>
+              <a:rPr lang="en-US" dirty="0"/>
+              <a:t>Access the BLOB</a:t>
+            </a:r>
+          </a:p>
+        </p:txBody>
+      </p:sp>
+      <p:pic>
+        <p:nvPicPr>
+          <p:cNvPr id="7" name="Picture 6">
+            <a:extLst>
+              <a:ext uri="{FF2B5EF4-FFF2-40B4-BE49-F238E27FC236}">
+                <a16:creationId xmlns:a16="http://schemas.microsoft.com/office/drawing/2014/main" id="{B3A6942E-2A56-F267-AB97-7F74E477FB84}"/>
+              </a:ext>
+            </a:extLst>
+          </p:cNvPr>
+          <p:cNvPicPr>
+            <a:picLocks noChangeAspect="1"/>
+          </p:cNvPicPr>
+          <p:nvPr/>
+        </p:nvPicPr>
+        <p:blipFill>
+          <a:blip r:embed="rId3"/>
+          <a:stretch>
+            <a:fillRect/>
+          </a:stretch>
+        </p:blipFill>
+        <p:spPr>
+          <a:xfrm>
+            <a:off x="838199" y="2057281"/>
+            <a:ext cx="6124207" cy="1735996"/>
+          </a:xfrm>
+          <a:prstGeom prst="rect">
+            <a:avLst/>
+          </a:prstGeom>
+        </p:spPr>
+      </p:pic>
+      <p:pic>
+        <p:nvPicPr>
+          <p:cNvPr id="9" name="Picture 8">
+            <a:extLst>
+              <a:ext uri="{FF2B5EF4-FFF2-40B4-BE49-F238E27FC236}">
+                <a16:creationId xmlns:a16="http://schemas.microsoft.com/office/drawing/2014/main" id="{505BAD6F-2674-8233-4621-42AEBD982138}"/>
+              </a:ext>
+            </a:extLst>
+          </p:cNvPr>
+          <p:cNvPicPr>
+            <a:picLocks noChangeAspect="1"/>
+          </p:cNvPicPr>
+          <p:nvPr/>
+        </p:nvPicPr>
+        <p:blipFill>
+          <a:blip r:embed="rId4"/>
+          <a:stretch>
+            <a:fillRect/>
+          </a:stretch>
+        </p:blipFill>
+        <p:spPr>
+          <a:xfrm>
+            <a:off x="838199" y="4159870"/>
+            <a:ext cx="5427373" cy="1735996"/>
+          </a:xfrm>
+          <a:prstGeom prst="rect">
+            <a:avLst/>
+          </a:prstGeom>
+        </p:spPr>
+      </p:pic>
+    </p:spTree>
+    <p:extLst>
+      <p:ext uri="{BB962C8B-B14F-4D97-AF65-F5344CB8AC3E}">
+        <p14:creationId xmlns:p14="http://schemas.microsoft.com/office/powerpoint/2010/main" val="869897344"/>
+      </p:ext>
+    </p:extLst>
+  </p:cSld>
+  <p:clrMapOvr>
+    <a:masterClrMapping/>
+  </p:clrMapOvr>
+</p:sld>
+</file>
+
+<file path=ppt/slides/slide32.xml><?xml version="1.0" encoding="utf-8"?>
+<p:sld xmlns:a="http://schemas.openxmlformats.org/drawingml/2006/main" xmlns:r="http://schemas.openxmlformats.org/officeDocument/2006/relationships" xmlns:p="http://schemas.openxmlformats.org/presentationml/2006/main">
+  <p:cSld>
+    <p:spTree>
+      <p:nvGrpSpPr>
+        <p:cNvPr id="1" name="">
+          <a:extLst>
+            <a:ext uri="{FF2B5EF4-FFF2-40B4-BE49-F238E27FC236}">
+              <a16:creationId xmlns:a16="http://schemas.microsoft.com/office/drawing/2014/main" id="{55665620-7871-5B67-797F-4D7F6F6433A0}"/>
+            </a:ext>
+          </a:extLst>
+        </p:cNvPr>
+        <p:cNvGrpSpPr/>
+        <p:nvPr/>
+      </p:nvGrpSpPr>
+      <p:grpSpPr>
+        <a:xfrm>
+          <a:off x="0" y="0"/>
+          <a:ext cx="0" cy="0"/>
+          <a:chOff x="0" y="0"/>
+          <a:chExt cx="0" cy="0"/>
+        </a:xfrm>
+      </p:grpSpPr>
+      <p:sp>
+        <p:nvSpPr>
+          <p:cNvPr id="4" name="Title 3">
+            <a:extLst>
+              <a:ext uri="{FF2B5EF4-FFF2-40B4-BE49-F238E27FC236}">
+                <a16:creationId xmlns:a16="http://schemas.microsoft.com/office/drawing/2014/main" id="{84C29BEA-A4BA-50A6-F384-78E18FAC007D}"/>
+              </a:ext>
+            </a:extLst>
+          </p:cNvPr>
+          <p:cNvSpPr>
+            <a:spLocks noGrp="1"/>
+          </p:cNvSpPr>
+          <p:nvPr>
+            <p:ph type="title"/>
+          </p:nvPr>
+        </p:nvSpPr>
+        <p:spPr/>
+        <p:txBody>
+          <a:bodyPr/>
+          <a:lstStyle/>
+          <a:p>
+            <a:r>
+              <a:rPr lang="en-GB" dirty="0" err="1">
+                <a:solidFill>
+                  <a:schemeClr val="accent2"/>
+                </a:solidFill>
+              </a:rPr>
+              <a:t>voicemail.db</a:t>
+            </a:r>
+            <a:endParaRPr lang="en-US" dirty="0">
+              <a:solidFill>
+                <a:schemeClr val="accent2"/>
+              </a:solidFill>
+            </a:endParaRPr>
+          </a:p>
+        </p:txBody>
+      </p:sp>
+      <p:sp>
+        <p:nvSpPr>
+          <p:cNvPr id="5" name="Text Placeholder 4">
+            <a:extLst>
+              <a:ext uri="{FF2B5EF4-FFF2-40B4-BE49-F238E27FC236}">
+                <a16:creationId xmlns:a16="http://schemas.microsoft.com/office/drawing/2014/main" id="{0B18FC7F-0826-79A1-93FE-29328D546C25}"/>
+              </a:ext>
+            </a:extLst>
+          </p:cNvPr>
+          <p:cNvSpPr>
+            <a:spLocks noGrp="1"/>
+          </p:cNvSpPr>
+          <p:nvPr>
+            <p:ph type="body" idx="1"/>
+          </p:nvPr>
+        </p:nvSpPr>
+        <p:spPr/>
+        <p:txBody>
+          <a:bodyPr/>
+          <a:lstStyle/>
+          <a:p>
+            <a:endParaRPr lang="en-US"/>
+          </a:p>
+        </p:txBody>
+      </p:sp>
+    </p:spTree>
+    <p:extLst>
+      <p:ext uri="{BB962C8B-B14F-4D97-AF65-F5344CB8AC3E}">
+        <p14:creationId xmlns:p14="http://schemas.microsoft.com/office/powerpoint/2010/main" val="2573116480"/>
+      </p:ext>
+    </p:extLst>
+  </p:cSld>
+  <p:clrMapOvr>
+    <a:masterClrMapping/>
+  </p:clrMapOvr>
+</p:sld>
+</file>
+
+<file path=ppt/slides/slide33.xml><?xml version="1.0" encoding="utf-8"?>
+<p:sld xmlns:a="http://schemas.openxmlformats.org/drawingml/2006/main" xmlns:r="http://schemas.openxmlformats.org/officeDocument/2006/relationships" xmlns:p="http://schemas.openxmlformats.org/presentationml/2006/main">
+  <p:cSld>
+    <p:spTree>
+      <p:nvGrpSpPr>
+        <p:cNvPr id="1" name=""/>
+        <p:cNvGrpSpPr/>
+        <p:nvPr/>
+      </p:nvGrpSpPr>
+      <p:grpSpPr>
+        <a:xfrm>
+          <a:off x="0" y="0"/>
+          <a:ext cx="0" cy="0"/>
+          <a:chOff x="0" y="0"/>
+          <a:chExt cx="0" cy="0"/>
+        </a:xfrm>
+      </p:grpSpPr>
+      <p:sp>
+        <p:nvSpPr>
+          <p:cNvPr id="2" name="Title 1">
+            <a:extLst>
+              <a:ext uri="{FF2B5EF4-FFF2-40B4-BE49-F238E27FC236}">
+                <a16:creationId xmlns:a16="http://schemas.microsoft.com/office/drawing/2014/main" id="{84AAD71E-1D63-4FE9-8A2D-A3C04021473A}"/>
+              </a:ext>
+            </a:extLst>
+          </p:cNvPr>
+          <p:cNvSpPr>
+            <a:spLocks noGrp="1"/>
+          </p:cNvSpPr>
+          <p:nvPr>
+            <p:ph type="title"/>
+          </p:nvPr>
+        </p:nvSpPr>
+        <p:spPr/>
+        <p:txBody>
+          <a:bodyPr/>
+          <a:lstStyle/>
+          <a:p>
+            <a:r>
+              <a:rPr lang="en-US" dirty="0"/>
+              <a:t>What is the greeting message?</a:t>
+            </a:r>
+          </a:p>
+        </p:txBody>
+      </p:sp>
+      <p:sp>
+        <p:nvSpPr>
+          <p:cNvPr id="3" name="Content Placeholder 2">
+            <a:extLst>
+              <a:ext uri="{FF2B5EF4-FFF2-40B4-BE49-F238E27FC236}">
+                <a16:creationId xmlns:a16="http://schemas.microsoft.com/office/drawing/2014/main" id="{C7D96ACB-A16D-4162-A340-47BFCF3CAD6A}"/>
+              </a:ext>
+            </a:extLst>
+          </p:cNvPr>
+          <p:cNvSpPr>
+            <a:spLocks noGrp="1"/>
+          </p:cNvSpPr>
+          <p:nvPr>
+            <p:ph idx="1"/>
+          </p:nvPr>
+        </p:nvSpPr>
+        <p:spPr>
+          <a:xfrm>
+            <a:off x="838200" y="1825625"/>
+            <a:ext cx="10515600" cy="636838"/>
+          </a:xfrm>
+        </p:spPr>
+        <p:txBody>
+          <a:bodyPr>
+            <a:normAutofit fontScale="85000" lnSpcReduction="20000"/>
+          </a:bodyPr>
+          <a:lstStyle/>
+          <a:p>
+            <a:r>
+              <a:rPr lang="en-US" dirty="0"/>
+              <a:t>The owner often provides greeting message. Did the owner use a greeting message?</a:t>
+            </a:r>
+          </a:p>
+        </p:txBody>
+      </p:sp>
+      <p:pic>
+        <p:nvPicPr>
+          <p:cNvPr id="5" name="Picture 4" descr="Text&#10;&#10;Description automatically generated">
+            <a:extLst>
+              <a:ext uri="{FF2B5EF4-FFF2-40B4-BE49-F238E27FC236}">
+                <a16:creationId xmlns:a16="http://schemas.microsoft.com/office/drawing/2014/main" id="{DE102491-6098-4C0F-8CDF-2ECB8C93DD1C}"/>
+              </a:ext>
+            </a:extLst>
+          </p:cNvPr>
+          <p:cNvPicPr>
+            <a:picLocks noChangeAspect="1"/>
+          </p:cNvPicPr>
+          <p:nvPr/>
+        </p:nvPicPr>
+        <p:blipFill>
+          <a:blip r:embed="rId2"/>
+          <a:stretch>
+            <a:fillRect/>
+          </a:stretch>
+        </p:blipFill>
+        <p:spPr>
+          <a:xfrm>
+            <a:off x="1037854" y="2735179"/>
+            <a:ext cx="7514844" cy="3684130"/>
+          </a:xfrm>
+          <a:prstGeom prst="rect">
+            <a:avLst/>
+          </a:prstGeom>
+        </p:spPr>
+      </p:pic>
+    </p:spTree>
+    <p:extLst>
+      <p:ext uri="{BB962C8B-B14F-4D97-AF65-F5344CB8AC3E}">
+        <p14:creationId xmlns:p14="http://schemas.microsoft.com/office/powerpoint/2010/main" val="4195252170"/>
+      </p:ext>
+    </p:extLst>
+  </p:cSld>
+  <p:clrMapOvr>
+    <a:masterClrMapping/>
+  </p:clrMapOvr>
+</p:sld>
+</file>
+
+<file path=ppt/slides/slide34.xml><?xml version="1.0" encoding="utf-8"?>
 <p:sld xmlns:a="http://schemas.openxmlformats.org/drawingml/2006/main" xmlns:r="http://schemas.openxmlformats.org/officeDocument/2006/relationships" xmlns:p="http://schemas.openxmlformats.org/presentationml/2006/main">
   <p:cSld>
     <p:spTree>
@@ -16439,7 +17479,7 @@
 </p:sld>
 </file>
 
-<file path=ppt/slides/slide31.xml><?xml version="1.0" encoding="utf-8"?>
+<file path=ppt/slides/slide35.xml><?xml version="1.0" encoding="utf-8"?>
 <p:sld xmlns:a="http://schemas.openxmlformats.org/drawingml/2006/main" xmlns:r="http://schemas.openxmlformats.org/officeDocument/2006/relationships" xmlns:p="http://schemas.openxmlformats.org/presentationml/2006/main">
   <p:cSld>
     <p:spTree>
@@ -17085,7 +18125,7 @@
           <a:p>
             <a:r>
               <a:rPr lang="en-US" dirty="0"/>
-              <a:t>Databases</a:t>
+              <a:t>Dialer Databases</a:t>
             </a:r>
           </a:p>
         </p:txBody>

</xml_diff>

<commit_message>
improve Android 10 thrid party app ppts
</commit_message>
<xml_diff>
--- a/Android10/5_2_2_GMS_App_Investigations_Dialer.pptx
+++ b/Android10/5_2_2_GMS_App_Investigations_Dialer.pptx
@@ -5740,7 +5740,7 @@
   <pc:docChgLst>
     <pc:chgData name="Weifeng Xu" userId="e7aed605-a3dd-4d5a-a692-a87037af107b" providerId="ADAL" clId="{C93986A8-D257-46D5-A932-87F105AEF0C6}"/>
     <pc:docChg chg="undo redo custSel addSld delSld modSld sldOrd">
-      <pc:chgData name="Weifeng Xu" userId="e7aed605-a3dd-4d5a-a692-a87037af107b" providerId="ADAL" clId="{C93986A8-D257-46D5-A932-87F105AEF0C6}" dt="2025-04-23T14:12:02.738" v="3140" actId="1076"/>
+      <pc:chgData name="Weifeng Xu" userId="e7aed605-a3dd-4d5a-a692-a87037af107b" providerId="ADAL" clId="{C93986A8-D257-46D5-A932-87F105AEF0C6}" dt="2025-04-28T12:32:32.868" v="3143" actId="20577"/>
       <pc:docMkLst>
         <pc:docMk/>
       </pc:docMkLst>
@@ -6338,44 +6338,12 @@
           <pc:docMk/>
           <pc:sldMk cId="1495699096" sldId="539"/>
         </pc:sldMkLst>
-        <pc:spChg chg="add del mod">
-          <ac:chgData name="Weifeng Xu" userId="e7aed605-a3dd-4d5a-a692-a87037af107b" providerId="ADAL" clId="{C93986A8-D257-46D5-A932-87F105AEF0C6}" dt="2025-04-23T14:00:51.386" v="3037" actId="478"/>
-          <ac:spMkLst>
-            <pc:docMk/>
-            <pc:sldMk cId="1495699096" sldId="539"/>
-            <ac:spMk id="3" creationId="{C248125D-58D9-AA2D-94EB-7A8F5530FF69}"/>
-          </ac:spMkLst>
-        </pc:spChg>
-        <pc:spChg chg="add del">
-          <ac:chgData name="Weifeng Xu" userId="e7aed605-a3dd-4d5a-a692-a87037af107b" providerId="ADAL" clId="{C93986A8-D257-46D5-A932-87F105AEF0C6}" dt="2025-04-23T14:03:34.233" v="3057" actId="478"/>
-          <ac:spMkLst>
-            <pc:docMk/>
-            <pc:sldMk cId="1495699096" sldId="539"/>
-            <ac:spMk id="4" creationId="{839E01B5-FEAE-F946-76B6-6F2E39289AE2}"/>
-          </ac:spMkLst>
-        </pc:spChg>
-        <pc:spChg chg="add del mod">
-          <ac:chgData name="Weifeng Xu" userId="e7aed605-a3dd-4d5a-a692-a87037af107b" providerId="ADAL" clId="{C93986A8-D257-46D5-A932-87F105AEF0C6}" dt="2025-04-23T14:03:41.136" v="3059" actId="478"/>
-          <ac:spMkLst>
-            <pc:docMk/>
-            <pc:sldMk cId="1495699096" sldId="539"/>
-            <ac:spMk id="8" creationId="{B5651676-C79B-DD14-5955-D2B361B87A24}"/>
-          </ac:spMkLst>
-        </pc:spChg>
         <pc:spChg chg="mod">
           <ac:chgData name="Weifeng Xu" userId="e7aed605-a3dd-4d5a-a692-a87037af107b" providerId="ADAL" clId="{C93986A8-D257-46D5-A932-87F105AEF0C6}" dt="2025-04-23T14:03:45.394" v="3060" actId="1076"/>
           <ac:spMkLst>
             <pc:docMk/>
             <pc:sldMk cId="1495699096" sldId="539"/>
             <ac:spMk id="10" creationId="{38963192-A564-4C49-BA1C-22C3F488DFF0}"/>
-          </ac:spMkLst>
-        </pc:spChg>
-        <pc:spChg chg="del">
-          <ac:chgData name="Weifeng Xu" userId="e7aed605-a3dd-4d5a-a692-a87037af107b" providerId="ADAL" clId="{C93986A8-D257-46D5-A932-87F105AEF0C6}" dt="2025-04-23T14:03:38.242" v="3058" actId="478"/>
-          <ac:spMkLst>
-            <pc:docMk/>
-            <pc:sldMk cId="1495699096" sldId="539"/>
-            <ac:spMk id="11" creationId="{884103A9-E37C-4959-A633-0363560DA7CE}"/>
           </ac:spMkLst>
         </pc:spChg>
         <pc:picChg chg="mod">
@@ -6394,14 +6362,6 @@
             <ac:picMk id="7" creationId="{390BE3CF-794C-4B41-85D5-B314048A8AED}"/>
           </ac:picMkLst>
         </pc:picChg>
-        <pc:picChg chg="del">
-          <ac:chgData name="Weifeng Xu" userId="e7aed605-a3dd-4d5a-a692-a87037af107b" providerId="ADAL" clId="{C93986A8-D257-46D5-A932-87F105AEF0C6}" dt="2025-04-23T14:03:38.242" v="3058" actId="478"/>
-          <ac:picMkLst>
-            <pc:docMk/>
-            <pc:sldMk cId="1495699096" sldId="539"/>
-            <ac:picMk id="9" creationId="{B6516974-8E35-4D9E-8B52-0F9861769110}"/>
-          </ac:picMkLst>
-        </pc:picChg>
       </pc:sldChg>
       <pc:sldChg chg="addSp delSp modSp new mod modClrScheme chgLayout">
         <pc:chgData name="Weifeng Xu" userId="e7aed605-a3dd-4d5a-a692-a87037af107b" providerId="ADAL" clId="{C93986A8-D257-46D5-A932-87F105AEF0C6}" dt="2025-04-15T15:06:05.377" v="2493" actId="20577"/>
@@ -6473,7 +6433,7 @@
         </pc:spChg>
       </pc:sldChg>
       <pc:sldChg chg="addSp delSp modSp new mod modClrScheme chgLayout">
-        <pc:chgData name="Weifeng Xu" userId="e7aed605-a3dd-4d5a-a692-a87037af107b" providerId="ADAL" clId="{C93986A8-D257-46D5-A932-87F105AEF0C6}" dt="2025-04-15T15:19:38.922" v="2673" actId="207"/>
+        <pc:chgData name="Weifeng Xu" userId="e7aed605-a3dd-4d5a-a692-a87037af107b" providerId="ADAL" clId="{C93986A8-D257-46D5-A932-87F105AEF0C6}" dt="2025-04-28T12:32:32.868" v="3143" actId="20577"/>
         <pc:sldMkLst>
           <pc:docMk/>
           <pc:sldMk cId="250569170" sldId="543"/>
@@ -6487,7 +6447,7 @@
           </ac:spMkLst>
         </pc:spChg>
         <pc:spChg chg="add mod ord">
-          <ac:chgData name="Weifeng Xu" userId="e7aed605-a3dd-4d5a-a692-a87037af107b" providerId="ADAL" clId="{C93986A8-D257-46D5-A932-87F105AEF0C6}" dt="2025-04-15T15:18:51.301" v="2648" actId="27636"/>
+          <ac:chgData name="Weifeng Xu" userId="e7aed605-a3dd-4d5a-a692-a87037af107b" providerId="ADAL" clId="{C93986A8-D257-46D5-A932-87F105AEF0C6}" dt="2025-04-28T12:32:32.868" v="3143" actId="20577"/>
           <ac:spMkLst>
             <pc:docMk/>
             <pc:sldMk cId="250569170" sldId="543"/>
@@ -6761,14 +6721,6 @@
           <pc:docMk/>
           <pc:sldMk cId="674427553" sldId="556"/>
         </pc:sldMkLst>
-        <pc:picChg chg="add del mod">
-          <ac:chgData name="Weifeng Xu" userId="e7aed605-a3dd-4d5a-a692-a87037af107b" providerId="ADAL" clId="{C93986A8-D257-46D5-A932-87F105AEF0C6}" dt="2025-04-23T13:36:20.523" v="2873" actId="478"/>
-          <ac:picMkLst>
-            <pc:docMk/>
-            <pc:sldMk cId="674427553" sldId="556"/>
-            <ac:picMk id="3" creationId="{715FBD11-8589-D6BB-6E5C-0EE218871829}"/>
-          </ac:picMkLst>
-        </pc:picChg>
         <pc:picChg chg="add mod">
           <ac:chgData name="Weifeng Xu" userId="e7aed605-a3dd-4d5a-a692-a87037af107b" providerId="ADAL" clId="{C93986A8-D257-46D5-A932-87F105AEF0C6}" dt="2025-04-23T13:36:47.251" v="2876" actId="1076"/>
           <ac:picMkLst>
@@ -6800,14 +6752,6 @@
             <ac:spMk id="3" creationId="{68FDF470-BF87-92FD-26B4-CF9CE27F9631}"/>
           </ac:spMkLst>
         </pc:spChg>
-        <pc:spChg chg="add mod">
-          <ac:chgData name="Weifeng Xu" userId="e7aed605-a3dd-4d5a-a692-a87037af107b" providerId="ADAL" clId="{C93986A8-D257-46D5-A932-87F105AEF0C6}" dt="2025-04-23T13:39:36.903" v="2995"/>
-          <ac:spMkLst>
-            <pc:docMk/>
-            <pc:sldMk cId="792115356" sldId="557"/>
-            <ac:spMk id="4" creationId="{FBB21A85-A85C-4C2C-795D-0E0B368E714F}"/>
-          </ac:spMkLst>
-        </pc:spChg>
       </pc:sldChg>
       <pc:sldChg chg="addSp delSp modSp add mod modClrScheme chgLayout">
         <pc:chgData name="Weifeng Xu" userId="e7aed605-a3dd-4d5a-a692-a87037af107b" providerId="ADAL" clId="{C93986A8-D257-46D5-A932-87F105AEF0C6}" dt="2025-04-23T14:07:36.650" v="3122" actId="6549"/>
@@ -6821,22 +6765,6 @@
             <pc:docMk/>
             <pc:sldMk cId="204470065" sldId="558"/>
             <ac:spMk id="2" creationId="{E77662BB-5E19-1844-09CE-C040110E0FC5}"/>
-          </ac:spMkLst>
-        </pc:spChg>
-        <pc:spChg chg="add del mod ord">
-          <ac:chgData name="Weifeng Xu" userId="e7aed605-a3dd-4d5a-a692-a87037af107b" providerId="ADAL" clId="{C93986A8-D257-46D5-A932-87F105AEF0C6}" dt="2025-04-23T14:05:00.314" v="3084" actId="700"/>
-          <ac:spMkLst>
-            <pc:docMk/>
-            <pc:sldMk cId="204470065" sldId="558"/>
-            <ac:spMk id="3" creationId="{453C7C40-E646-6FD6-6F83-46161622F8FE}"/>
-          </ac:spMkLst>
-        </pc:spChg>
-        <pc:spChg chg="del mod">
-          <ac:chgData name="Weifeng Xu" userId="e7aed605-a3dd-4d5a-a692-a87037af107b" providerId="ADAL" clId="{C93986A8-D257-46D5-A932-87F105AEF0C6}" dt="2025-04-23T14:03:58.719" v="3063" actId="478"/>
-          <ac:spMkLst>
-            <pc:docMk/>
-            <pc:sldMk cId="204470065" sldId="558"/>
-            <ac:spMk id="4" creationId="{DFB1B673-83A9-4316-A8B7-F7FE3E4F59A4}"/>
           </ac:spMkLst>
         </pc:spChg>
         <pc:spChg chg="add mod ord">
@@ -6847,46 +6775,6 @@
             <ac:spMk id="6" creationId="{CAD5851A-A011-5D7C-F84D-94BC70EEB92D}"/>
           </ac:spMkLst>
         </pc:spChg>
-        <pc:spChg chg="del mod">
-          <ac:chgData name="Weifeng Xu" userId="e7aed605-a3dd-4d5a-a692-a87037af107b" providerId="ADAL" clId="{C93986A8-D257-46D5-A932-87F105AEF0C6}" dt="2025-04-23T14:05:04.696" v="3087"/>
-          <ac:spMkLst>
-            <pc:docMk/>
-            <pc:sldMk cId="204470065" sldId="558"/>
-            <ac:spMk id="8" creationId="{C86D0EED-2218-E01A-416D-BC6E7FD36317}"/>
-          </ac:spMkLst>
-        </pc:spChg>
-        <pc:spChg chg="del">
-          <ac:chgData name="Weifeng Xu" userId="e7aed605-a3dd-4d5a-a692-a87037af107b" providerId="ADAL" clId="{C93986A8-D257-46D5-A932-87F105AEF0C6}" dt="2025-04-23T14:03:51.623" v="3061" actId="478"/>
-          <ac:spMkLst>
-            <pc:docMk/>
-            <pc:sldMk cId="204470065" sldId="558"/>
-            <ac:spMk id="10" creationId="{3EDA4DB6-6CB4-8408-8308-AD95EC9D6F28}"/>
-          </ac:spMkLst>
-        </pc:spChg>
-        <pc:spChg chg="del mod">
-          <ac:chgData name="Weifeng Xu" userId="e7aed605-a3dd-4d5a-a692-a87037af107b" providerId="ADAL" clId="{C93986A8-D257-46D5-A932-87F105AEF0C6}" dt="2025-04-23T14:04:14.241" v="3066" actId="478"/>
-          <ac:spMkLst>
-            <pc:docMk/>
-            <pc:sldMk cId="204470065" sldId="558"/>
-            <ac:spMk id="11" creationId="{0B96F8FD-8197-681E-EB74-255B17042D20}"/>
-          </ac:spMkLst>
-        </pc:spChg>
-        <pc:picChg chg="del">
-          <ac:chgData name="Weifeng Xu" userId="e7aed605-a3dd-4d5a-a692-a87037af107b" providerId="ADAL" clId="{C93986A8-D257-46D5-A932-87F105AEF0C6}" dt="2025-04-23T14:03:51.623" v="3061" actId="478"/>
-          <ac:picMkLst>
-            <pc:docMk/>
-            <pc:sldMk cId="204470065" sldId="558"/>
-            <ac:picMk id="5" creationId="{59B97951-19C9-26B3-F5F8-59E69090F7C4}"/>
-          </ac:picMkLst>
-        </pc:picChg>
-        <pc:picChg chg="del">
-          <ac:chgData name="Weifeng Xu" userId="e7aed605-a3dd-4d5a-a692-a87037af107b" providerId="ADAL" clId="{C93986A8-D257-46D5-A932-87F105AEF0C6}" dt="2025-04-23T14:03:51.623" v="3061" actId="478"/>
-          <ac:picMkLst>
-            <pc:docMk/>
-            <pc:sldMk cId="204470065" sldId="558"/>
-            <ac:picMk id="7" creationId="{E583F806-330C-D641-D006-77EA4EBD18A6}"/>
-          </ac:picMkLst>
-        </pc:picChg>
         <pc:picChg chg="mod modCrop">
           <ac:chgData name="Weifeng Xu" userId="e7aed605-a3dd-4d5a-a692-a87037af107b" providerId="ADAL" clId="{C93986A8-D257-46D5-A932-87F105AEF0C6}" dt="2025-04-23T14:05:31.418" v="3094" actId="1076"/>
           <ac:picMkLst>
@@ -6910,22 +6798,6 @@
             <ac:spMk id="2" creationId="{F470E545-9371-FF9B-EA3E-4174C4CC30BB}"/>
           </ac:spMkLst>
         </pc:spChg>
-        <pc:spChg chg="del">
-          <ac:chgData name="Weifeng Xu" userId="e7aed605-a3dd-4d5a-a692-a87037af107b" providerId="ADAL" clId="{C93986A8-D257-46D5-A932-87F105AEF0C6}" dt="2025-04-23T14:08:30.556" v="3127" actId="700"/>
-          <ac:spMkLst>
-            <pc:docMk/>
-            <pc:sldMk cId="869897344" sldId="559"/>
-            <ac:spMk id="3" creationId="{0794A95B-03F4-465F-D34B-1F8C17761B5C}"/>
-          </ac:spMkLst>
-        </pc:spChg>
-        <pc:picChg chg="add del mod">
-          <ac:chgData name="Weifeng Xu" userId="e7aed605-a3dd-4d5a-a692-a87037af107b" providerId="ADAL" clId="{C93986A8-D257-46D5-A932-87F105AEF0C6}" dt="2025-04-23T14:11:01.222" v="3131" actId="478"/>
-          <ac:picMkLst>
-            <pc:docMk/>
-            <pc:sldMk cId="869897344" sldId="559"/>
-            <ac:picMk id="5" creationId="{97AA1BE3-9BC4-3D30-2BB1-67BF8E1A1381}"/>
-          </ac:picMkLst>
-        </pc:picChg>
         <pc:picChg chg="add mod">
           <ac:chgData name="Weifeng Xu" userId="e7aed605-a3dd-4d5a-a692-a87037af107b" providerId="ADAL" clId="{C93986A8-D257-46D5-A932-87F105AEF0C6}" dt="2025-04-23T14:12:01.548" v="3139" actId="1076"/>
           <ac:picMkLst>
@@ -7991,7 +7863,7 @@
           <a:p>
             <a:fld id="{EE41F6E3-57F9-402E-BDBA-5B2DE11C8530}" type="datetimeFigureOut">
               <a:rPr lang="en-US" smtClean="0"/>
-              <a:t>4/23/2025</a:t>
+              <a:t>4/28/2025</a:t>
             </a:fld>
             <a:endParaRPr lang="en-US"/>
           </a:p>
@@ -9176,7 +9048,7 @@
           <a:p>
             <a:fld id="{4263717A-E3C1-4BED-ABE0-B7069385E023}" type="datetimeFigureOut">
               <a:rPr lang="en-US" smtClean="0"/>
-              <a:t>4/23/2025</a:t>
+              <a:t>4/28/2025</a:t>
             </a:fld>
             <a:endParaRPr lang="en-US"/>
           </a:p>
@@ -9349,7 +9221,7 @@
           <a:p>
             <a:fld id="{4263717A-E3C1-4BED-ABE0-B7069385E023}" type="datetimeFigureOut">
               <a:rPr lang="en-US" smtClean="0"/>
-              <a:t>4/23/2025</a:t>
+              <a:t>4/28/2025</a:t>
             </a:fld>
             <a:endParaRPr lang="en-US"/>
           </a:p>
@@ -9527,7 +9399,7 @@
           <a:p>
             <a:fld id="{4263717A-E3C1-4BED-ABE0-B7069385E023}" type="datetimeFigureOut">
               <a:rPr lang="en-US" smtClean="0"/>
-              <a:t>4/23/2025</a:t>
+              <a:t>4/28/2025</a:t>
             </a:fld>
             <a:endParaRPr lang="en-US"/>
           </a:p>
@@ -9695,7 +9567,7 @@
           <a:p>
             <a:fld id="{4263717A-E3C1-4BED-ABE0-B7069385E023}" type="datetimeFigureOut">
               <a:rPr lang="en-US" smtClean="0"/>
-              <a:t>4/23/2025</a:t>
+              <a:t>4/28/2025</a:t>
             </a:fld>
             <a:endParaRPr lang="en-US"/>
           </a:p>
@@ -9940,7 +9812,7 @@
           <a:p>
             <a:fld id="{4263717A-E3C1-4BED-ABE0-B7069385E023}" type="datetimeFigureOut">
               <a:rPr lang="en-US" smtClean="0"/>
-              <a:t>4/23/2025</a:t>
+              <a:t>4/28/2025</a:t>
             </a:fld>
             <a:endParaRPr lang="en-US"/>
           </a:p>
@@ -10169,7 +10041,7 @@
           <a:p>
             <a:fld id="{4263717A-E3C1-4BED-ABE0-B7069385E023}" type="datetimeFigureOut">
               <a:rPr lang="en-US" smtClean="0"/>
-              <a:t>4/23/2025</a:t>
+              <a:t>4/28/2025</a:t>
             </a:fld>
             <a:endParaRPr lang="en-US"/>
           </a:p>
@@ -10533,7 +10405,7 @@
           <a:p>
             <a:fld id="{4263717A-E3C1-4BED-ABE0-B7069385E023}" type="datetimeFigureOut">
               <a:rPr lang="en-US" smtClean="0"/>
-              <a:t>4/23/2025</a:t>
+              <a:t>4/28/2025</a:t>
             </a:fld>
             <a:endParaRPr lang="en-US"/>
           </a:p>
@@ -10650,7 +10522,7 @@
           <a:p>
             <a:fld id="{4263717A-E3C1-4BED-ABE0-B7069385E023}" type="datetimeFigureOut">
               <a:rPr lang="en-US" smtClean="0"/>
-              <a:t>4/23/2025</a:t>
+              <a:t>4/28/2025</a:t>
             </a:fld>
             <a:endParaRPr lang="en-US"/>
           </a:p>
@@ -10745,7 +10617,7 @@
           <a:p>
             <a:fld id="{4263717A-E3C1-4BED-ABE0-B7069385E023}" type="datetimeFigureOut">
               <a:rPr lang="en-US" smtClean="0"/>
-              <a:t>4/23/2025</a:t>
+              <a:t>4/28/2025</a:t>
             </a:fld>
             <a:endParaRPr lang="en-US"/>
           </a:p>
@@ -11020,7 +10892,7 @@
           <a:p>
             <a:fld id="{4263717A-E3C1-4BED-ABE0-B7069385E023}" type="datetimeFigureOut">
               <a:rPr lang="en-US" smtClean="0"/>
-              <a:t>4/23/2025</a:t>
+              <a:t>4/28/2025</a:t>
             </a:fld>
             <a:endParaRPr lang="en-US"/>
           </a:p>
@@ -11272,7 +11144,7 @@
           <a:p>
             <a:fld id="{4263717A-E3C1-4BED-ABE0-B7069385E023}" type="datetimeFigureOut">
               <a:rPr lang="en-US" smtClean="0"/>
-              <a:t>4/23/2025</a:t>
+              <a:t>4/28/2025</a:t>
             </a:fld>
             <a:endParaRPr lang="en-US"/>
           </a:p>
@@ -11483,7 +11355,7 @@
           <a:p>
             <a:fld id="{4263717A-E3C1-4BED-ABE0-B7069385E023}" type="datetimeFigureOut">
               <a:rPr lang="en-US" smtClean="0"/>
-              <a:t>4/23/2025</a:t>
+              <a:t>4/28/2025</a:t>
             </a:fld>
             <a:endParaRPr lang="en-US"/>
           </a:p>
@@ -15376,8 +15248,12 @@
           <a:p>
             <a:pPr lvl="1"/>
             <a:r>
+              <a:rPr lang="en-GB"/>
+              <a:t>allows </a:t>
+            </a:r>
+            <a:r>
               <a:rPr lang="en-GB" dirty="0"/>
-              <a:t> Allows users to quickly find contacts by typing a portion of a name or number, with the app suggesting matches as they type.</a:t>
+              <a:t>users to quickly find contacts by typing a portion of a name or number, with the app suggesting matches as they type.</a:t>
             </a:r>
           </a:p>
           <a:p>

</xml_diff>